<commit_message>
Update day 1 slides and README
</commit_message>
<xml_diff>
--- a/day 1/germline_variant_calling_slides.pptx
+++ b/day 1/germline_variant_calling_slides.pptx
@@ -13,19 +13,25 @@
     <p:sldId id="276" r:id="rId7"/>
     <p:sldId id="278" r:id="rId8"/>
     <p:sldId id="279" r:id="rId9"/>
-    <p:sldId id="280" r:id="rId10"/>
-    <p:sldId id="281" r:id="rId11"/>
-    <p:sldId id="282" r:id="rId12"/>
-    <p:sldId id="283" r:id="rId13"/>
-    <p:sldId id="284" r:id="rId14"/>
-    <p:sldId id="285" r:id="rId15"/>
-    <p:sldId id="277" r:id="rId16"/>
-    <p:sldId id="260" r:id="rId17"/>
-    <p:sldId id="289" r:id="rId18"/>
-    <p:sldId id="288" r:id="rId19"/>
-    <p:sldId id="287" r:id="rId20"/>
-    <p:sldId id="286" r:id="rId21"/>
-    <p:sldId id="264" r:id="rId22"/>
+    <p:sldId id="292" r:id="rId10"/>
+    <p:sldId id="280" r:id="rId11"/>
+    <p:sldId id="281" r:id="rId12"/>
+    <p:sldId id="282" r:id="rId13"/>
+    <p:sldId id="293" r:id="rId14"/>
+    <p:sldId id="283" r:id="rId15"/>
+    <p:sldId id="284" r:id="rId16"/>
+    <p:sldId id="285" r:id="rId17"/>
+    <p:sldId id="277" r:id="rId18"/>
+    <p:sldId id="291" r:id="rId19"/>
+    <p:sldId id="294" r:id="rId20"/>
+    <p:sldId id="260" r:id="rId21"/>
+    <p:sldId id="289" r:id="rId22"/>
+    <p:sldId id="288" r:id="rId23"/>
+    <p:sldId id="287" r:id="rId24"/>
+    <p:sldId id="286" r:id="rId25"/>
+    <p:sldId id="264" r:id="rId26"/>
+    <p:sldId id="296" r:id="rId27"/>
+    <p:sldId id="297" r:id="rId28"/>
   </p:sldIdLst>
   <p:sldSz cx="12192000" cy="6858000"/>
   <p:notesSz cx="6858000" cy="9144000"/>
@@ -7902,7 +7908,7 @@
               <a:buChar char="o"/>
             </a:pPr>
             <a:r>
-              <a:rPr lang="en-US" sz="2000" dirty="0">
+              <a:rPr lang="en-US" sz="2800" dirty="0">
                 <a:latin typeface="Arial" panose="020B0604020202020204" pitchFamily="34" charset="0"/>
                 <a:cs typeface="Arial" panose="020B0604020202020204" pitchFamily="34" charset="0"/>
               </a:rPr>
@@ -7915,16 +7921,12 @@
               <a:buChar char="o"/>
             </a:pPr>
             <a:r>
-              <a:rPr lang="en-US" sz="2800" dirty="0">
+              <a:rPr lang="en-US" sz="2000" dirty="0">
                 <a:latin typeface="Arial" panose="020B0604020202020204" pitchFamily="34" charset="0"/>
                 <a:cs typeface="Arial" panose="020B0604020202020204" pitchFamily="34" charset="0"/>
               </a:rPr>
               <a:t>Generating mapping summary statistics</a:t>
             </a:r>
-            <a:endParaRPr lang="en-US" sz="2000" dirty="0">
-              <a:latin typeface="Arial" panose="020B0604020202020204" pitchFamily="34" charset="0"/>
-              <a:cs typeface="Arial" panose="020B0604020202020204" pitchFamily="34" charset="0"/>
-            </a:endParaRPr>
           </a:p>
           <a:p>
             <a:pPr lvl="1">
@@ -7983,7 +7985,7 @@
     </p:spTree>
     <p:extLst>
       <p:ext uri="{BB962C8B-B14F-4D97-AF65-F5344CB8AC3E}">
-        <p14:creationId xmlns:p14="http://schemas.microsoft.com/office/powerpoint/2010/main" val="91871430"/>
+        <p14:creationId xmlns:p14="http://schemas.microsoft.com/office/powerpoint/2010/main" val="2817376352"/>
       </p:ext>
     </p:extLst>
   </p:cSld>
@@ -8120,12 +8122,16 @@
               <a:buChar char="o"/>
             </a:pPr>
             <a:r>
-              <a:rPr lang="en-US" sz="2000" dirty="0">
+              <a:rPr lang="en-US" sz="2800" dirty="0">
                 <a:latin typeface="Arial" panose="020B0604020202020204" pitchFamily="34" charset="0"/>
                 <a:cs typeface="Arial" panose="020B0604020202020204" pitchFamily="34" charset="0"/>
               </a:rPr>
               <a:t>Generating mapping summary statistics</a:t>
             </a:r>
+            <a:endParaRPr lang="en-US" sz="2000" dirty="0">
+              <a:latin typeface="Arial" panose="020B0604020202020204" pitchFamily="34" charset="0"/>
+              <a:cs typeface="Arial" panose="020B0604020202020204" pitchFamily="34" charset="0"/>
+            </a:endParaRPr>
           </a:p>
           <a:p>
             <a:pPr lvl="1">
@@ -8133,16 +8139,12 @@
               <a:buChar char="o"/>
             </a:pPr>
             <a:r>
-              <a:rPr lang="en-US" sz="2800" dirty="0">
+              <a:rPr lang="en-US" sz="2000" dirty="0">
                 <a:latin typeface="Arial" panose="020B0604020202020204" pitchFamily="34" charset="0"/>
                 <a:cs typeface="Arial" panose="020B0604020202020204" pitchFamily="34" charset="0"/>
               </a:rPr>
               <a:t>Filtering reads based on SAM/BAM flags</a:t>
             </a:r>
-            <a:endParaRPr lang="en-US" sz="2000" dirty="0">
-              <a:latin typeface="Arial" panose="020B0604020202020204" pitchFamily="34" charset="0"/>
-              <a:cs typeface="Arial" panose="020B0604020202020204" pitchFamily="34" charset="0"/>
-            </a:endParaRPr>
           </a:p>
           <a:p>
             <a:pPr lvl="1">
@@ -8154,7 +8156,7 @@
                 <a:latin typeface="Arial" panose="020B0604020202020204" pitchFamily="34" charset="0"/>
                 <a:cs typeface="Arial" panose="020B0604020202020204" pitchFamily="34" charset="0"/>
               </a:rPr>
-              <a:t>Add information in BAM files </a:t>
+              <a:t>Add information in BAM files</a:t>
             </a:r>
           </a:p>
           <a:p>
@@ -8188,7 +8190,7 @@
     </p:spTree>
     <p:extLst>
       <p:ext uri="{BB962C8B-B14F-4D97-AF65-F5344CB8AC3E}">
-        <p14:creationId xmlns:p14="http://schemas.microsoft.com/office/powerpoint/2010/main" val="1649513732"/>
+        <p14:creationId xmlns:p14="http://schemas.microsoft.com/office/powerpoint/2010/main" val="91871430"/>
       </p:ext>
     </p:extLst>
   </p:cSld>
@@ -8338,12 +8340,16 @@
               <a:buChar char="o"/>
             </a:pPr>
             <a:r>
-              <a:rPr lang="en-US" sz="2000" dirty="0">
+              <a:rPr lang="en-US" sz="2800" dirty="0">
                 <a:latin typeface="Arial" panose="020B0604020202020204" pitchFamily="34" charset="0"/>
                 <a:cs typeface="Arial" panose="020B0604020202020204" pitchFamily="34" charset="0"/>
               </a:rPr>
               <a:t>Filtering reads based on SAM/BAM flags</a:t>
             </a:r>
+            <a:endParaRPr lang="en-US" sz="2000" dirty="0">
+              <a:latin typeface="Arial" panose="020B0604020202020204" pitchFamily="34" charset="0"/>
+              <a:cs typeface="Arial" panose="020B0604020202020204" pitchFamily="34" charset="0"/>
+            </a:endParaRPr>
           </a:p>
           <a:p>
             <a:pPr lvl="1">
@@ -8351,16 +8357,12 @@
               <a:buChar char="o"/>
             </a:pPr>
             <a:r>
-              <a:rPr lang="en-US" sz="2800" dirty="0">
-                <a:latin typeface="Arial" panose="020B0604020202020204" pitchFamily="34" charset="0"/>
-                <a:cs typeface="Arial" panose="020B0604020202020204" pitchFamily="34" charset="0"/>
-              </a:rPr>
-              <a:t>Add sample information in BAM files</a:t>
-            </a:r>
-            <a:endParaRPr lang="en-US" sz="2000" dirty="0">
-              <a:latin typeface="Arial" panose="020B0604020202020204" pitchFamily="34" charset="0"/>
-              <a:cs typeface="Arial" panose="020B0604020202020204" pitchFamily="34" charset="0"/>
-            </a:endParaRPr>
+              <a:rPr lang="en-US" sz="2000" dirty="0">
+                <a:latin typeface="Arial" panose="020B0604020202020204" pitchFamily="34" charset="0"/>
+                <a:cs typeface="Arial" panose="020B0604020202020204" pitchFamily="34" charset="0"/>
+              </a:rPr>
+              <a:t>Add information in BAM files </a:t>
+            </a:r>
           </a:p>
           <a:p>
             <a:pPr lvl="1">
@@ -8393,7 +8395,7 @@
     </p:spTree>
     <p:extLst>
       <p:ext uri="{BB962C8B-B14F-4D97-AF65-F5344CB8AC3E}">
-        <p14:creationId xmlns:p14="http://schemas.microsoft.com/office/powerpoint/2010/main" val="2703104296"/>
+        <p14:creationId xmlns:p14="http://schemas.microsoft.com/office/powerpoint/2010/main" val="1649513732"/>
       </p:ext>
     </p:extLst>
   </p:cSld>
@@ -8425,7 +8427,7 @@
           <p:cNvPr id="2" name="Τίτλος 1">
             <a:extLst>
               <a:ext uri="{FF2B5EF4-FFF2-40B4-BE49-F238E27FC236}">
-                <a16:creationId xmlns:a16="http://schemas.microsoft.com/office/drawing/2014/main" id="{F0300657-4206-75AF-86C8-E86F6EBE0B5C}"/>
+                <a16:creationId xmlns:a16="http://schemas.microsoft.com/office/drawing/2014/main" id="{4649FD2E-AB49-E983-90C0-96F6D7EFAC64}"/>
               </a:ext>
             </a:extLst>
           </p:cNvPr>
@@ -8443,7 +8445,7 @@
           <a:p>
             <a:r>
               <a:rPr lang="en-US" dirty="0"/>
-              <a:t>Steps prior to Variant detection</a:t>
+              <a:t>SAM &amp; BAM format – the alignment section</a:t>
             </a:r>
           </a:p>
         </p:txBody>
@@ -8453,7 +8455,7 @@
           <p:cNvPr id="3" name="Θέση περιεχομένου 2">
             <a:extLst>
               <a:ext uri="{FF2B5EF4-FFF2-40B4-BE49-F238E27FC236}">
-                <a16:creationId xmlns:a16="http://schemas.microsoft.com/office/drawing/2014/main" id="{F89B6D53-6D09-A4F9-982C-F01BF9C25915}"/>
+                <a16:creationId xmlns:a16="http://schemas.microsoft.com/office/drawing/2014/main" id="{951CDCA1-53FB-D14F-2548-2281FD9D80D0}"/>
               </a:ext>
             </a:extLst>
           </p:cNvPr>
@@ -8466,139 +8468,110 @@
         </p:nvSpPr>
         <p:spPr>
           <a:xfrm>
-            <a:off x="2589212" y="2133600"/>
-            <a:ext cx="9307716" cy="4539574"/>
+            <a:off x="2589212" y="5244152"/>
+            <a:ext cx="8915400" cy="667069"/>
           </a:xfrm>
         </p:spPr>
         <p:txBody>
-          <a:bodyPr>
-            <a:normAutofit lnSpcReduction="10000"/>
-          </a:bodyPr>
+          <a:bodyPr/>
           <a:lstStyle/>
           <a:p>
             <a:r>
-              <a:rPr lang="en-US" sz="2400" dirty="0">
-                <a:latin typeface="Arial" panose="020B0604020202020204" pitchFamily="34" charset="0"/>
-                <a:cs typeface="Arial" panose="020B0604020202020204" pitchFamily="34" charset="0"/>
-              </a:rPr>
-              <a:t>Quality control</a:t>
-            </a:r>
-          </a:p>
-          <a:p>
-            <a:r>
-              <a:rPr lang="en-US" sz="2400" dirty="0">
-                <a:latin typeface="Arial" panose="020B0604020202020204" pitchFamily="34" charset="0"/>
-                <a:cs typeface="Arial" panose="020B0604020202020204" pitchFamily="34" charset="0"/>
-              </a:rPr>
-              <a:t>Trimming of low-quality and/or adapter sequences</a:t>
-            </a:r>
-          </a:p>
-          <a:p>
-            <a:r>
-              <a:rPr lang="en-US" sz="2400" dirty="0">
-                <a:latin typeface="Arial" panose="020B0604020202020204" pitchFamily="34" charset="0"/>
-                <a:cs typeface="Arial" panose="020B0604020202020204" pitchFamily="34" charset="0"/>
-              </a:rPr>
-              <a:t>Mapping reads to reference genome</a:t>
-            </a:r>
-          </a:p>
-          <a:p>
-            <a:r>
-              <a:rPr lang="en-US" sz="2400" dirty="0">
-                <a:latin typeface="Arial" panose="020B0604020202020204" pitchFamily="34" charset="0"/>
-                <a:cs typeface="Arial" panose="020B0604020202020204" pitchFamily="34" charset="0"/>
-              </a:rPr>
-              <a:t>Post-processing of mapped reads</a:t>
-            </a:r>
-          </a:p>
-          <a:p>
-            <a:pPr lvl="1">
-              <a:buFont typeface="Courier New" panose="02070309020205020404" pitchFamily="49" charset="0"/>
-              <a:buChar char="o"/>
-            </a:pPr>
-            <a:r>
-              <a:rPr lang="en-US" sz="2000" dirty="0">
-                <a:latin typeface="Arial" panose="020B0604020202020204" pitchFamily="34" charset="0"/>
-                <a:cs typeface="Arial" panose="020B0604020202020204" pitchFamily="34" charset="0"/>
-              </a:rPr>
-              <a:t>SAM-to-BAM format conversion</a:t>
-            </a:r>
-          </a:p>
-          <a:p>
-            <a:pPr lvl="1">
-              <a:buFont typeface="Courier New" panose="02070309020205020404" pitchFamily="49" charset="0"/>
-              <a:buChar char="o"/>
-            </a:pPr>
-            <a:r>
-              <a:rPr lang="en-US" sz="2000" dirty="0">
-                <a:latin typeface="Arial" panose="020B0604020202020204" pitchFamily="34" charset="0"/>
-                <a:cs typeface="Arial" panose="020B0604020202020204" pitchFamily="34" charset="0"/>
-              </a:rPr>
-              <a:t>Generating mapping summary statistics</a:t>
-            </a:r>
-          </a:p>
-          <a:p>
-            <a:pPr lvl="1">
-              <a:buFont typeface="Courier New" panose="02070309020205020404" pitchFamily="49" charset="0"/>
-              <a:buChar char="o"/>
-            </a:pPr>
-            <a:r>
-              <a:rPr lang="en-US" sz="2000" dirty="0">
-                <a:latin typeface="Arial" panose="020B0604020202020204" pitchFamily="34" charset="0"/>
-                <a:cs typeface="Arial" panose="020B0604020202020204" pitchFamily="34" charset="0"/>
-              </a:rPr>
-              <a:t>Filtering reads based on SAM/BAM flags</a:t>
-            </a:r>
-          </a:p>
-          <a:p>
-            <a:pPr lvl="1">
-              <a:buFont typeface="Courier New" panose="02070309020205020404" pitchFamily="49" charset="0"/>
-              <a:buChar char="o"/>
-            </a:pPr>
-            <a:r>
-              <a:rPr lang="en-US" sz="2000" dirty="0">
-                <a:latin typeface="Arial" panose="020B0604020202020204" pitchFamily="34" charset="0"/>
-                <a:cs typeface="Arial" panose="020B0604020202020204" pitchFamily="34" charset="0"/>
-              </a:rPr>
-              <a:t>Add information in BAM files</a:t>
-            </a:r>
-          </a:p>
-          <a:p>
-            <a:pPr lvl="1">
-              <a:buFont typeface="Courier New" panose="02070309020205020404" pitchFamily="49" charset="0"/>
-              <a:buChar char="o"/>
-            </a:pPr>
-            <a:r>
-              <a:rPr lang="en-US" sz="2800" dirty="0">
-                <a:latin typeface="Arial" panose="020B0604020202020204" pitchFamily="34" charset="0"/>
-                <a:cs typeface="Arial" panose="020B0604020202020204" pitchFamily="34" charset="0"/>
-              </a:rPr>
-              <a:t>Mark duplicated reads</a:t>
-            </a:r>
-            <a:endParaRPr lang="en-US" sz="2000" dirty="0">
-              <a:latin typeface="Arial" panose="020B0604020202020204" pitchFamily="34" charset="0"/>
-              <a:cs typeface="Arial" panose="020B0604020202020204" pitchFamily="34" charset="0"/>
-            </a:endParaRPr>
-          </a:p>
-          <a:p>
-            <a:pPr lvl="1">
-              <a:buFont typeface="Courier New" panose="02070309020205020404" pitchFamily="49" charset="0"/>
-              <a:buChar char="o"/>
-            </a:pPr>
-            <a:r>
-              <a:rPr lang="en-US" sz="2000" dirty="0">
-                <a:latin typeface="Arial" panose="020B0604020202020204" pitchFamily="34" charset="0"/>
-                <a:cs typeface="Arial" panose="020B0604020202020204" pitchFamily="34" charset="0"/>
-              </a:rPr>
-              <a:t>Generate reference indexes</a:t>
-            </a:r>
+              <a:rPr lang="en-US" dirty="0">
+                <a:hlinkClick r:id="rId2"/>
+              </a:rPr>
+              <a:t>https://broadinstitute.github.io/picard/explain-flags.html</a:t>
+            </a:r>
+            <a:endParaRPr lang="en-US" dirty="0"/>
+          </a:p>
+        </p:txBody>
+      </p:sp>
+      <p:pic>
+        <p:nvPicPr>
+          <p:cNvPr id="5" name="Εικόνα 4">
+            <a:extLst>
+              <a:ext uri="{FF2B5EF4-FFF2-40B4-BE49-F238E27FC236}">
+                <a16:creationId xmlns:a16="http://schemas.microsoft.com/office/drawing/2014/main" id="{4D40E9D2-FB1C-883B-28FF-7FBBD9BCE00F}"/>
+              </a:ext>
+            </a:extLst>
+          </p:cNvPr>
+          <p:cNvPicPr>
+            <a:picLocks noChangeAspect="1"/>
+          </p:cNvPicPr>
+          <p:nvPr/>
+        </p:nvPicPr>
+        <p:blipFill>
+          <a:blip r:embed="rId3"/>
+          <a:stretch>
+            <a:fillRect/>
+          </a:stretch>
+        </p:blipFill>
+        <p:spPr>
+          <a:xfrm>
+            <a:off x="2589212" y="2133599"/>
+            <a:ext cx="8915400" cy="2881955"/>
+          </a:xfrm>
+          <a:prstGeom prst="rect">
+            <a:avLst/>
+          </a:prstGeom>
+        </p:spPr>
+      </p:pic>
+      <p:sp>
+        <p:nvSpPr>
+          <p:cNvPr id="6" name="Ορθογώνιο 5">
+            <a:extLst>
+              <a:ext uri="{FF2B5EF4-FFF2-40B4-BE49-F238E27FC236}">
+                <a16:creationId xmlns:a16="http://schemas.microsoft.com/office/drawing/2014/main" id="{62CE1948-7F57-5A99-C332-979C45350059}"/>
+              </a:ext>
+            </a:extLst>
+          </p:cNvPr>
+          <p:cNvSpPr/>
+          <p:nvPr/>
+        </p:nvSpPr>
+        <p:spPr>
+          <a:xfrm>
+            <a:off x="2947481" y="2675106"/>
+            <a:ext cx="6060332" cy="204281"/>
+          </a:xfrm>
+          <a:prstGeom prst="rect">
+            <a:avLst/>
+          </a:prstGeom>
+          <a:noFill/>
+          <a:ln>
+            <a:solidFill>
+              <a:srgbClr val="FF0000"/>
+            </a:solidFill>
+          </a:ln>
+        </p:spPr>
+        <p:style>
+          <a:lnRef idx="2">
+            <a:schemeClr val="accent1">
+              <a:shade val="50000"/>
+            </a:schemeClr>
+          </a:lnRef>
+          <a:fillRef idx="1">
+            <a:schemeClr val="accent1"/>
+          </a:fillRef>
+          <a:effectRef idx="0">
+            <a:schemeClr val="accent1"/>
+          </a:effectRef>
+          <a:fontRef idx="minor">
+            <a:schemeClr val="lt1"/>
+          </a:fontRef>
+        </p:style>
+        <p:txBody>
+          <a:bodyPr rtlCol="0" anchor="ctr"/>
+          <a:lstStyle/>
+          <a:p>
+            <a:pPr algn="ctr"/>
+            <a:endParaRPr lang="en-US"/>
           </a:p>
         </p:txBody>
       </p:sp>
     </p:spTree>
     <p:extLst>
       <p:ext uri="{BB962C8B-B14F-4D97-AF65-F5344CB8AC3E}">
-        <p14:creationId xmlns:p14="http://schemas.microsoft.com/office/powerpoint/2010/main" val="636783401"/>
+        <p14:creationId xmlns:p14="http://schemas.microsoft.com/office/powerpoint/2010/main" val="2426913157"/>
       </p:ext>
     </p:extLst>
   </p:cSld>
@@ -8761,12 +8734,16 @@
               <a:buChar char="o"/>
             </a:pPr>
             <a:r>
-              <a:rPr lang="en-US" sz="2000" dirty="0">
-                <a:latin typeface="Arial" panose="020B0604020202020204" pitchFamily="34" charset="0"/>
-                <a:cs typeface="Arial" panose="020B0604020202020204" pitchFamily="34" charset="0"/>
-              </a:rPr>
-              <a:t>Add information in BAM files</a:t>
-            </a:r>
+              <a:rPr lang="en-US" sz="2800" dirty="0">
+                <a:latin typeface="Arial" panose="020B0604020202020204" pitchFamily="34" charset="0"/>
+                <a:cs typeface="Arial" panose="020B0604020202020204" pitchFamily="34" charset="0"/>
+              </a:rPr>
+              <a:t>Add sample information in BAM files</a:t>
+            </a:r>
+            <a:endParaRPr lang="en-US" sz="2000" dirty="0">
+              <a:latin typeface="Arial" panose="020B0604020202020204" pitchFamily="34" charset="0"/>
+              <a:cs typeface="Arial" panose="020B0604020202020204" pitchFamily="34" charset="0"/>
+            </a:endParaRPr>
           </a:p>
           <a:p>
             <a:pPr lvl="1">
@@ -8787,23 +8764,19 @@
               <a:buChar char="o"/>
             </a:pPr>
             <a:r>
-              <a:rPr lang="en-US" sz="2800" dirty="0">
-                <a:latin typeface="Arial" panose="020B0604020202020204" pitchFamily="34" charset="0"/>
-                <a:cs typeface="Arial" panose="020B0604020202020204" pitchFamily="34" charset="0"/>
-              </a:rPr>
-              <a:t>Generate indexes</a:t>
-            </a:r>
-            <a:endParaRPr lang="en-US" sz="2000" dirty="0">
-              <a:latin typeface="Arial" panose="020B0604020202020204" pitchFamily="34" charset="0"/>
-              <a:cs typeface="Arial" panose="020B0604020202020204" pitchFamily="34" charset="0"/>
-            </a:endParaRPr>
+              <a:rPr lang="en-US" sz="2000" dirty="0">
+                <a:latin typeface="Arial" panose="020B0604020202020204" pitchFamily="34" charset="0"/>
+                <a:cs typeface="Arial" panose="020B0604020202020204" pitchFamily="34" charset="0"/>
+              </a:rPr>
+              <a:t>Generate reference indexes</a:t>
+            </a:r>
           </a:p>
         </p:txBody>
       </p:sp>
     </p:spTree>
     <p:extLst>
       <p:ext uri="{BB962C8B-B14F-4D97-AF65-F5344CB8AC3E}">
-        <p14:creationId xmlns:p14="http://schemas.microsoft.com/office/powerpoint/2010/main" val="1978793633"/>
+        <p14:creationId xmlns:p14="http://schemas.microsoft.com/office/powerpoint/2010/main" val="2703104296"/>
       </p:ext>
     </p:extLst>
   </p:cSld>
@@ -8835,7 +8808,7 @@
           <p:cNvPr id="2" name="Τίτλος 1">
             <a:extLst>
               <a:ext uri="{FF2B5EF4-FFF2-40B4-BE49-F238E27FC236}">
-                <a16:creationId xmlns:a16="http://schemas.microsoft.com/office/drawing/2014/main" id="{A9187543-90C9-C511-0833-19C8FD701B9B}"/>
+                <a16:creationId xmlns:a16="http://schemas.microsoft.com/office/drawing/2014/main" id="{F0300657-4206-75AF-86C8-E86F6EBE0B5C}"/>
               </a:ext>
             </a:extLst>
           </p:cNvPr>
@@ -8853,7 +8826,7 @@
           <a:p>
             <a:r>
               <a:rPr lang="en-US" dirty="0"/>
-              <a:t>Variant detection</a:t>
+              <a:t>Steps prior to Variant detection</a:t>
             </a:r>
           </a:p>
         </p:txBody>
@@ -8863,7 +8836,7 @@
           <p:cNvPr id="3" name="Θέση περιεχομένου 2">
             <a:extLst>
               <a:ext uri="{FF2B5EF4-FFF2-40B4-BE49-F238E27FC236}">
-                <a16:creationId xmlns:a16="http://schemas.microsoft.com/office/drawing/2014/main" id="{BC3A2E2C-13F8-1AA1-1F30-400543CA1193}"/>
+                <a16:creationId xmlns:a16="http://schemas.microsoft.com/office/drawing/2014/main" id="{F89B6D53-6D09-A4F9-982C-F01BF9C25915}"/>
               </a:ext>
             </a:extLst>
           </p:cNvPr>
@@ -8874,134 +8847,133 @@
             <p:ph idx="1"/>
           </p:nvPr>
         </p:nvSpPr>
-        <p:spPr/>
+        <p:spPr>
+          <a:xfrm>
+            <a:off x="2589212" y="2133600"/>
+            <a:ext cx="9307716" cy="4539574"/>
+          </a:xfrm>
+        </p:spPr>
         <p:txBody>
-          <a:bodyPr/>
+          <a:bodyPr>
+            <a:normAutofit lnSpcReduction="10000"/>
+          </a:bodyPr>
           <a:lstStyle/>
           <a:p>
-            <a:pPr algn="just"/>
-            <a:r>
-              <a:rPr lang="en-US" b="0" i="0" dirty="0">
-                <a:solidFill>
-                  <a:srgbClr val="212529"/>
-                </a:solidFill>
-                <a:effectLst/>
-                <a:latin typeface="Arial" panose="020B0604020202020204" pitchFamily="34" charset="0"/>
-                <a:cs typeface="Arial" panose="020B0604020202020204" pitchFamily="34" charset="0"/>
-              </a:rPr>
-              <a:t>We will use </a:t>
-            </a:r>
-            <a:r>
-              <a:rPr lang="en-US" b="1" i="1" dirty="0">
-                <a:solidFill>
-                  <a:srgbClr val="212529"/>
-                </a:solidFill>
-                <a:effectLst/>
-                <a:latin typeface="Arial" panose="020B0604020202020204" pitchFamily="34" charset="0"/>
-                <a:cs typeface="Arial" panose="020B0604020202020204" pitchFamily="34" charset="0"/>
-                <a:hlinkClick r:id="rId2"/>
-              </a:rPr>
-              <a:t>FreeBayes</a:t>
-            </a:r>
-            <a:r>
-              <a:rPr lang="en-US" i="0" dirty="0">
-                <a:solidFill>
-                  <a:srgbClr val="212529"/>
-                </a:solidFill>
-                <a:effectLst/>
-                <a:latin typeface="Arial" panose="020B0604020202020204" pitchFamily="34" charset="0"/>
-                <a:cs typeface="Arial" panose="020B0604020202020204" pitchFamily="34" charset="0"/>
-              </a:rPr>
-              <a:t> </a:t>
-            </a:r>
-            <a:r>
-              <a:rPr lang="en-US" b="0" i="0" dirty="0">
-                <a:solidFill>
-                  <a:srgbClr val="212529"/>
-                </a:solidFill>
-                <a:effectLst/>
-                <a:latin typeface="Arial" panose="020B0604020202020204" pitchFamily="34" charset="0"/>
-                <a:cs typeface="Arial" panose="020B0604020202020204" pitchFamily="34" charset="0"/>
-              </a:rPr>
-              <a:t>to call our variants</a:t>
-            </a:r>
-          </a:p>
-          <a:p>
-            <a:pPr algn="just"/>
-            <a:r>
-              <a:rPr lang="en-US" i="1" dirty="0">
-                <a:solidFill>
-                  <a:srgbClr val="212529"/>
-                </a:solidFill>
-                <a:effectLst/>
-                <a:latin typeface="Arial" panose="020B0604020202020204" pitchFamily="34" charset="0"/>
-                <a:cs typeface="Arial" panose="020B0604020202020204" pitchFamily="34" charset="0"/>
-              </a:rPr>
-              <a:t>FreeBayes</a:t>
-            </a:r>
-            <a:r>
-              <a:rPr lang="en-US" b="0" i="0" dirty="0">
-                <a:solidFill>
-                  <a:srgbClr val="212529"/>
-                </a:solidFill>
-                <a:effectLst/>
-                <a:latin typeface="Arial" panose="020B0604020202020204" pitchFamily="34" charset="0"/>
-                <a:cs typeface="Arial" panose="020B0604020202020204" pitchFamily="34" charset="0"/>
-              </a:rPr>
-              <a:t> is a Bayesian genetic variant detector designed to find small polymorphisms, specifically SNPs (single-nucleotide polymorphisms), indels (insertions and deletions), MNPs (multi-nucleotide polymorphisms), and complex events (composite insertion and substitution events) smaller than the length of a short-read sequencing alignment</a:t>
-            </a:r>
-          </a:p>
-          <a:p>
-            <a:pPr algn="just"/>
-            <a:r>
-              <a:rPr lang="en-US" dirty="0">
-                <a:solidFill>
-                  <a:srgbClr val="212529"/>
-                </a:solidFill>
-                <a:latin typeface="Arial" panose="020B0604020202020204" pitchFamily="34" charset="0"/>
-                <a:cs typeface="Arial" panose="020B0604020202020204" pitchFamily="34" charset="0"/>
-              </a:rPr>
-              <a:t>Similar software tools include:</a:t>
-            </a:r>
-          </a:p>
-          <a:p>
-            <a:pPr lvl="1" algn="just"/>
-            <a:r>
-              <a:rPr lang="en-US" dirty="0">
-                <a:latin typeface="Arial" panose="020B0604020202020204" pitchFamily="34" charset="0"/>
-                <a:cs typeface="Arial" panose="020B0604020202020204" pitchFamily="34" charset="0"/>
-              </a:rPr>
-              <a:t>GATK HaplotypeCaller</a:t>
-            </a:r>
-          </a:p>
-          <a:p>
-            <a:pPr lvl="1" algn="just"/>
-            <a:r>
-              <a:rPr lang="en-US" dirty="0">
-                <a:latin typeface="Arial" panose="020B0604020202020204" pitchFamily="34" charset="0"/>
-                <a:cs typeface="Arial" panose="020B0604020202020204" pitchFamily="34" charset="0"/>
-              </a:rPr>
-              <a:t>GATK Mutect2 (emphasis on somatic variants)</a:t>
-            </a:r>
-          </a:p>
-          <a:p>
-            <a:pPr lvl="1" algn="just"/>
-            <a:r>
-              <a:rPr lang="en-US" dirty="0">
-                <a:latin typeface="Arial" panose="020B0604020202020204" pitchFamily="34" charset="0"/>
-                <a:cs typeface="Arial" panose="020B0604020202020204" pitchFamily="34" charset="0"/>
-              </a:rPr>
-              <a:t>bcftools</a:t>
-            </a:r>
-          </a:p>
-          <a:p>
-            <a:pPr lvl="1" algn="just"/>
-            <a:r>
-              <a:rPr lang="en-US" dirty="0">
-                <a:latin typeface="Arial" panose="020B0604020202020204" pitchFamily="34" charset="0"/>
-                <a:cs typeface="Arial" panose="020B0604020202020204" pitchFamily="34" charset="0"/>
-              </a:rPr>
-              <a:t>varscan2</a:t>
+            <a:r>
+              <a:rPr lang="en-US" sz="2400" dirty="0">
+                <a:latin typeface="Arial" panose="020B0604020202020204" pitchFamily="34" charset="0"/>
+                <a:cs typeface="Arial" panose="020B0604020202020204" pitchFamily="34" charset="0"/>
+              </a:rPr>
+              <a:t>Quality control</a:t>
+            </a:r>
+          </a:p>
+          <a:p>
+            <a:r>
+              <a:rPr lang="en-US" sz="2400" dirty="0">
+                <a:latin typeface="Arial" panose="020B0604020202020204" pitchFamily="34" charset="0"/>
+                <a:cs typeface="Arial" panose="020B0604020202020204" pitchFamily="34" charset="0"/>
+              </a:rPr>
+              <a:t>Trimming of low-quality and/or adapter sequences</a:t>
+            </a:r>
+          </a:p>
+          <a:p>
+            <a:r>
+              <a:rPr lang="en-US" sz="2400" dirty="0">
+                <a:latin typeface="Arial" panose="020B0604020202020204" pitchFamily="34" charset="0"/>
+                <a:cs typeface="Arial" panose="020B0604020202020204" pitchFamily="34" charset="0"/>
+              </a:rPr>
+              <a:t>Mapping reads to reference genome</a:t>
+            </a:r>
+          </a:p>
+          <a:p>
+            <a:r>
+              <a:rPr lang="en-US" sz="2400" dirty="0">
+                <a:latin typeface="Arial" panose="020B0604020202020204" pitchFamily="34" charset="0"/>
+                <a:cs typeface="Arial" panose="020B0604020202020204" pitchFamily="34" charset="0"/>
+              </a:rPr>
+              <a:t>Post-processing of mapped reads</a:t>
+            </a:r>
+          </a:p>
+          <a:p>
+            <a:pPr lvl="1">
+              <a:buFont typeface="Courier New" panose="02070309020205020404" pitchFamily="49" charset="0"/>
+              <a:buChar char="o"/>
+            </a:pPr>
+            <a:r>
+              <a:rPr lang="en-US" sz="2000" dirty="0">
+                <a:latin typeface="Arial" panose="020B0604020202020204" pitchFamily="34" charset="0"/>
+                <a:cs typeface="Arial" panose="020B0604020202020204" pitchFamily="34" charset="0"/>
+              </a:rPr>
+              <a:t>SAM-to-BAM format conversion</a:t>
+            </a:r>
+          </a:p>
+          <a:p>
+            <a:pPr lvl="1">
+              <a:buFont typeface="Courier New" panose="02070309020205020404" pitchFamily="49" charset="0"/>
+              <a:buChar char="o"/>
+            </a:pPr>
+            <a:r>
+              <a:rPr lang="en-US" sz="2000" dirty="0">
+                <a:latin typeface="Arial" panose="020B0604020202020204" pitchFamily="34" charset="0"/>
+                <a:cs typeface="Arial" panose="020B0604020202020204" pitchFamily="34" charset="0"/>
+              </a:rPr>
+              <a:t>Generating mapping summary statistics</a:t>
+            </a:r>
+          </a:p>
+          <a:p>
+            <a:pPr lvl="1">
+              <a:buFont typeface="Courier New" panose="02070309020205020404" pitchFamily="49" charset="0"/>
+              <a:buChar char="o"/>
+            </a:pPr>
+            <a:r>
+              <a:rPr lang="en-US" sz="2000" dirty="0">
+                <a:latin typeface="Arial" panose="020B0604020202020204" pitchFamily="34" charset="0"/>
+                <a:cs typeface="Arial" panose="020B0604020202020204" pitchFamily="34" charset="0"/>
+              </a:rPr>
+              <a:t>Filtering reads based on SAM/BAM flags</a:t>
+            </a:r>
+          </a:p>
+          <a:p>
+            <a:pPr lvl="1">
+              <a:buFont typeface="Courier New" panose="02070309020205020404" pitchFamily="49" charset="0"/>
+              <a:buChar char="o"/>
+            </a:pPr>
+            <a:r>
+              <a:rPr lang="en-US" sz="2000" dirty="0">
+                <a:latin typeface="Arial" panose="020B0604020202020204" pitchFamily="34" charset="0"/>
+                <a:cs typeface="Arial" panose="020B0604020202020204" pitchFamily="34" charset="0"/>
+              </a:rPr>
+              <a:t>Add information in BAM files</a:t>
+            </a:r>
+          </a:p>
+          <a:p>
+            <a:pPr lvl="1">
+              <a:buFont typeface="Courier New" panose="02070309020205020404" pitchFamily="49" charset="0"/>
+              <a:buChar char="o"/>
+            </a:pPr>
+            <a:r>
+              <a:rPr lang="en-US" sz="2800" dirty="0">
+                <a:latin typeface="Arial" panose="020B0604020202020204" pitchFamily="34" charset="0"/>
+                <a:cs typeface="Arial" panose="020B0604020202020204" pitchFamily="34" charset="0"/>
+              </a:rPr>
+              <a:t>Mark duplicated reads</a:t>
+            </a:r>
+            <a:endParaRPr lang="en-US" sz="2000" dirty="0">
+              <a:latin typeface="Arial" panose="020B0604020202020204" pitchFamily="34" charset="0"/>
+              <a:cs typeface="Arial" panose="020B0604020202020204" pitchFamily="34" charset="0"/>
+            </a:endParaRPr>
+          </a:p>
+          <a:p>
+            <a:pPr lvl="1">
+              <a:buFont typeface="Courier New" panose="02070309020205020404" pitchFamily="49" charset="0"/>
+              <a:buChar char="o"/>
+            </a:pPr>
+            <a:r>
+              <a:rPr lang="en-US" sz="2000" dirty="0">
+                <a:latin typeface="Arial" panose="020B0604020202020204" pitchFamily="34" charset="0"/>
+                <a:cs typeface="Arial" panose="020B0604020202020204" pitchFamily="34" charset="0"/>
+              </a:rPr>
+              <a:t>Generate reference indexes</a:t>
             </a:r>
           </a:p>
         </p:txBody>
@@ -9009,7 +8981,7 @@
     </p:spTree>
     <p:extLst>
       <p:ext uri="{BB962C8B-B14F-4D97-AF65-F5344CB8AC3E}">
-        <p14:creationId xmlns:p14="http://schemas.microsoft.com/office/powerpoint/2010/main" val="2310334249"/>
+        <p14:creationId xmlns:p14="http://schemas.microsoft.com/office/powerpoint/2010/main" val="636783401"/>
       </p:ext>
     </p:extLst>
   </p:cSld>
@@ -9041,7 +9013,7 @@
           <p:cNvPr id="2" name="Τίτλος 1">
             <a:extLst>
               <a:ext uri="{FF2B5EF4-FFF2-40B4-BE49-F238E27FC236}">
-                <a16:creationId xmlns:a16="http://schemas.microsoft.com/office/drawing/2014/main" id="{A9187543-90C9-C511-0833-19C8FD701B9B}"/>
+                <a16:creationId xmlns:a16="http://schemas.microsoft.com/office/drawing/2014/main" id="{F0300657-4206-75AF-86C8-E86F6EBE0B5C}"/>
               </a:ext>
             </a:extLst>
           </p:cNvPr>
@@ -9059,7 +9031,7 @@
           <a:p>
             <a:r>
               <a:rPr lang="en-US" dirty="0"/>
-              <a:t>Steps following Variant detection</a:t>
+              <a:t>Steps prior to Variant detection</a:t>
             </a:r>
           </a:p>
         </p:txBody>
@@ -9069,7 +9041,7 @@
           <p:cNvPr id="3" name="Θέση περιεχομένου 2">
             <a:extLst>
               <a:ext uri="{FF2B5EF4-FFF2-40B4-BE49-F238E27FC236}">
-                <a16:creationId xmlns:a16="http://schemas.microsoft.com/office/drawing/2014/main" id="{BC3A2E2C-13F8-1AA1-1F30-400543CA1193}"/>
+                <a16:creationId xmlns:a16="http://schemas.microsoft.com/office/drawing/2014/main" id="{F89B6D53-6D09-A4F9-982C-F01BF9C25915}"/>
               </a:ext>
             </a:extLst>
           </p:cNvPr>
@@ -9080,72 +9052,141 @@
             <p:ph idx="1"/>
           </p:nvPr>
         </p:nvSpPr>
-        <p:spPr/>
+        <p:spPr>
+          <a:xfrm>
+            <a:off x="2589212" y="2133600"/>
+            <a:ext cx="9307716" cy="4539574"/>
+          </a:xfrm>
+        </p:spPr>
         <p:txBody>
           <a:bodyPr>
-            <a:normAutofit/>
+            <a:normAutofit lnSpcReduction="10000"/>
           </a:bodyPr>
           <a:lstStyle/>
           <a:p>
-            <a:pPr algn="just"/>
-            <a:r>
-              <a:rPr lang="en-US" sz="3200" dirty="0">
-                <a:latin typeface="Arial" panose="020B0604020202020204" pitchFamily="34" charset="0"/>
-                <a:cs typeface="Arial" panose="020B0604020202020204" pitchFamily="34" charset="0"/>
-              </a:rPr>
-              <a:t>Compress and index VCF files</a:t>
-            </a:r>
-            <a:endParaRPr lang="en-US" sz="2400" dirty="0">
+            <a:r>
+              <a:rPr lang="en-US" sz="2400" dirty="0">
+                <a:latin typeface="Arial" panose="020B0604020202020204" pitchFamily="34" charset="0"/>
+                <a:cs typeface="Arial" panose="020B0604020202020204" pitchFamily="34" charset="0"/>
+              </a:rPr>
+              <a:t>Quality control</a:t>
+            </a:r>
+          </a:p>
+          <a:p>
+            <a:r>
+              <a:rPr lang="en-US" sz="2400" dirty="0">
+                <a:latin typeface="Arial" panose="020B0604020202020204" pitchFamily="34" charset="0"/>
+                <a:cs typeface="Arial" panose="020B0604020202020204" pitchFamily="34" charset="0"/>
+              </a:rPr>
+              <a:t>Trimming of low-quality and/or adapter sequences</a:t>
+            </a:r>
+          </a:p>
+          <a:p>
+            <a:r>
+              <a:rPr lang="en-US" sz="2400" dirty="0">
+                <a:latin typeface="Arial" panose="020B0604020202020204" pitchFamily="34" charset="0"/>
+                <a:cs typeface="Arial" panose="020B0604020202020204" pitchFamily="34" charset="0"/>
+              </a:rPr>
+              <a:t>Mapping reads to reference genome</a:t>
+            </a:r>
+          </a:p>
+          <a:p>
+            <a:r>
+              <a:rPr lang="en-US" sz="2400" dirty="0">
+                <a:latin typeface="Arial" panose="020B0604020202020204" pitchFamily="34" charset="0"/>
+                <a:cs typeface="Arial" panose="020B0604020202020204" pitchFamily="34" charset="0"/>
+              </a:rPr>
+              <a:t>Post-processing of mapped reads</a:t>
+            </a:r>
+          </a:p>
+          <a:p>
+            <a:pPr lvl="1">
+              <a:buFont typeface="Courier New" panose="02070309020205020404" pitchFamily="49" charset="0"/>
+              <a:buChar char="o"/>
+            </a:pPr>
+            <a:r>
+              <a:rPr lang="en-US" sz="2000" dirty="0">
+                <a:latin typeface="Arial" panose="020B0604020202020204" pitchFamily="34" charset="0"/>
+                <a:cs typeface="Arial" panose="020B0604020202020204" pitchFamily="34" charset="0"/>
+              </a:rPr>
+              <a:t>SAM-to-BAM format conversion</a:t>
+            </a:r>
+          </a:p>
+          <a:p>
+            <a:pPr lvl="1">
+              <a:buFont typeface="Courier New" panose="02070309020205020404" pitchFamily="49" charset="0"/>
+              <a:buChar char="o"/>
+            </a:pPr>
+            <a:r>
+              <a:rPr lang="en-US" sz="2000" dirty="0">
+                <a:latin typeface="Arial" panose="020B0604020202020204" pitchFamily="34" charset="0"/>
+                <a:cs typeface="Arial" panose="020B0604020202020204" pitchFamily="34" charset="0"/>
+              </a:rPr>
+              <a:t>Generating mapping summary statistics</a:t>
+            </a:r>
+          </a:p>
+          <a:p>
+            <a:pPr lvl="1">
+              <a:buFont typeface="Courier New" panose="02070309020205020404" pitchFamily="49" charset="0"/>
+              <a:buChar char="o"/>
+            </a:pPr>
+            <a:r>
+              <a:rPr lang="en-US" sz="2000" dirty="0">
+                <a:latin typeface="Arial" panose="020B0604020202020204" pitchFamily="34" charset="0"/>
+                <a:cs typeface="Arial" panose="020B0604020202020204" pitchFamily="34" charset="0"/>
+              </a:rPr>
+              <a:t>Filtering reads based on SAM/BAM flags</a:t>
+            </a:r>
+          </a:p>
+          <a:p>
+            <a:pPr lvl="1">
+              <a:buFont typeface="Courier New" panose="02070309020205020404" pitchFamily="49" charset="0"/>
+              <a:buChar char="o"/>
+            </a:pPr>
+            <a:r>
+              <a:rPr lang="en-US" sz="2000" dirty="0">
+                <a:latin typeface="Arial" panose="020B0604020202020204" pitchFamily="34" charset="0"/>
+                <a:cs typeface="Arial" panose="020B0604020202020204" pitchFamily="34" charset="0"/>
+              </a:rPr>
+              <a:t>Add information in BAM files</a:t>
+            </a:r>
+          </a:p>
+          <a:p>
+            <a:pPr lvl="1">
+              <a:buFont typeface="Courier New" panose="02070309020205020404" pitchFamily="49" charset="0"/>
+              <a:buChar char="o"/>
+            </a:pPr>
+            <a:r>
+              <a:rPr lang="en-US" sz="2000" dirty="0">
+                <a:latin typeface="Arial" panose="020B0604020202020204" pitchFamily="34" charset="0"/>
+                <a:cs typeface="Arial" panose="020B0604020202020204" pitchFamily="34" charset="0"/>
+              </a:rPr>
+              <a:t>Mark duplicated reads</a:t>
+            </a:r>
+          </a:p>
+          <a:p>
+            <a:pPr lvl="1">
+              <a:buFont typeface="Courier New" panose="02070309020205020404" pitchFamily="49" charset="0"/>
+              <a:buChar char="o"/>
+            </a:pPr>
+            <a:r>
+              <a:rPr lang="en-US" sz="2800" dirty="0">
+                <a:latin typeface="Arial" panose="020B0604020202020204" pitchFamily="34" charset="0"/>
+                <a:cs typeface="Arial" panose="020B0604020202020204" pitchFamily="34" charset="0"/>
+              </a:rPr>
+              <a:t>Generate indexes</a:t>
+            </a:r>
+            <a:endParaRPr lang="en-US" sz="2000" dirty="0">
               <a:latin typeface="Arial" panose="020B0604020202020204" pitchFamily="34" charset="0"/>
               <a:cs typeface="Arial" panose="020B0604020202020204" pitchFamily="34" charset="0"/>
             </a:endParaRPr>
           </a:p>
-          <a:p>
-            <a:pPr algn="just"/>
-            <a:r>
-              <a:rPr lang="en-US" sz="2400" dirty="0">
-                <a:latin typeface="Arial" panose="020B0604020202020204" pitchFamily="34" charset="0"/>
-                <a:cs typeface="Arial" panose="020B0604020202020204" pitchFamily="34" charset="0"/>
-              </a:rPr>
-              <a:t>Apply filters to the detected variants</a:t>
-            </a:r>
-          </a:p>
-          <a:p>
-            <a:pPr algn="just"/>
-            <a:r>
-              <a:rPr lang="en-US" sz="2400" dirty="0">
-                <a:latin typeface="Arial" panose="020B0604020202020204" pitchFamily="34" charset="0"/>
-                <a:cs typeface="Arial" panose="020B0604020202020204" pitchFamily="34" charset="0"/>
-              </a:rPr>
-              <a:t>Merge the VCF files of all samples</a:t>
-            </a:r>
-          </a:p>
-          <a:p>
-            <a:pPr algn="just"/>
-            <a:r>
-              <a:rPr lang="en-US" sz="2400" dirty="0">
-                <a:latin typeface="Arial" panose="020B0604020202020204" pitchFamily="34" charset="0"/>
-                <a:cs typeface="Arial" panose="020B0604020202020204" pitchFamily="34" charset="0"/>
-              </a:rPr>
-              <a:t>Format merged VCF files for further analysis</a:t>
-            </a:r>
-          </a:p>
-          <a:p>
-            <a:pPr algn="just"/>
-            <a:r>
-              <a:rPr lang="en-US" sz="2400" dirty="0">
-                <a:latin typeface="Arial" panose="020B0604020202020204" pitchFamily="34" charset="0"/>
-                <a:cs typeface="Arial" panose="020B0604020202020204" pitchFamily="34" charset="0"/>
-              </a:rPr>
-              <a:t>Annotation of the detected variants</a:t>
-            </a:r>
-          </a:p>
         </p:txBody>
       </p:sp>
     </p:spTree>
     <p:extLst>
       <p:ext uri="{BB962C8B-B14F-4D97-AF65-F5344CB8AC3E}">
-        <p14:creationId xmlns:p14="http://schemas.microsoft.com/office/powerpoint/2010/main" val="2848649862"/>
+        <p14:creationId xmlns:p14="http://schemas.microsoft.com/office/powerpoint/2010/main" val="1978793633"/>
       </p:ext>
     </p:extLst>
   </p:cSld>
@@ -9195,7 +9236,7 @@
           <a:p>
             <a:r>
               <a:rPr lang="en-US" dirty="0"/>
-              <a:t>Steps following Variant detection</a:t>
+              <a:t>Variant detection</a:t>
             </a:r>
           </a:p>
         </p:txBody>
@@ -9218,62 +9259,132 @@
         </p:nvSpPr>
         <p:spPr/>
         <p:txBody>
-          <a:bodyPr>
-            <a:normAutofit/>
-          </a:bodyPr>
+          <a:bodyPr/>
           <a:lstStyle/>
           <a:p>
             <a:pPr algn="just"/>
             <a:r>
-              <a:rPr lang="en-US" sz="2400" dirty="0">
-                <a:latin typeface="Arial" panose="020B0604020202020204" pitchFamily="34" charset="0"/>
-                <a:cs typeface="Arial" panose="020B0604020202020204" pitchFamily="34" charset="0"/>
-              </a:rPr>
-              <a:t>Compress and index VCF files</a:t>
+              <a:rPr lang="en-US" b="0" i="0" dirty="0">
+                <a:solidFill>
+                  <a:srgbClr val="212529"/>
+                </a:solidFill>
+                <a:effectLst/>
+                <a:latin typeface="Arial" panose="020B0604020202020204" pitchFamily="34" charset="0"/>
+                <a:cs typeface="Arial" panose="020B0604020202020204" pitchFamily="34" charset="0"/>
+              </a:rPr>
+              <a:t>We will use </a:t>
+            </a:r>
+            <a:r>
+              <a:rPr lang="en-US" b="1" i="1" dirty="0">
+                <a:solidFill>
+                  <a:srgbClr val="212529"/>
+                </a:solidFill>
+                <a:effectLst/>
+                <a:latin typeface="Arial" panose="020B0604020202020204" pitchFamily="34" charset="0"/>
+                <a:cs typeface="Arial" panose="020B0604020202020204" pitchFamily="34" charset="0"/>
+                <a:hlinkClick r:id="rId2"/>
+              </a:rPr>
+              <a:t>FreeBayes</a:t>
+            </a:r>
+            <a:r>
+              <a:rPr lang="en-US" i="0" dirty="0">
+                <a:solidFill>
+                  <a:srgbClr val="212529"/>
+                </a:solidFill>
+                <a:effectLst/>
+                <a:latin typeface="Arial" panose="020B0604020202020204" pitchFamily="34" charset="0"/>
+                <a:cs typeface="Arial" panose="020B0604020202020204" pitchFamily="34" charset="0"/>
+              </a:rPr>
+              <a:t> </a:t>
+            </a:r>
+            <a:r>
+              <a:rPr lang="en-US" b="0" i="0" dirty="0">
+                <a:solidFill>
+                  <a:srgbClr val="212529"/>
+                </a:solidFill>
+                <a:effectLst/>
+                <a:latin typeface="Arial" panose="020B0604020202020204" pitchFamily="34" charset="0"/>
+                <a:cs typeface="Arial" panose="020B0604020202020204" pitchFamily="34" charset="0"/>
+              </a:rPr>
+              <a:t>to call our variants</a:t>
             </a:r>
           </a:p>
           <a:p>
             <a:pPr algn="just"/>
             <a:r>
-              <a:rPr lang="en-US" sz="3200" dirty="0">
-                <a:latin typeface="Arial" panose="020B0604020202020204" pitchFamily="34" charset="0"/>
-                <a:cs typeface="Arial" panose="020B0604020202020204" pitchFamily="34" charset="0"/>
-              </a:rPr>
-              <a:t>Apply filters to the detected variants</a:t>
-            </a:r>
-            <a:endParaRPr lang="en-US" sz="2400" dirty="0">
-              <a:latin typeface="Arial" panose="020B0604020202020204" pitchFamily="34" charset="0"/>
-              <a:cs typeface="Arial" panose="020B0604020202020204" pitchFamily="34" charset="0"/>
-            </a:endParaRPr>
+              <a:rPr lang="en-US" i="1" dirty="0">
+                <a:solidFill>
+                  <a:srgbClr val="212529"/>
+                </a:solidFill>
+                <a:effectLst/>
+                <a:latin typeface="Arial" panose="020B0604020202020204" pitchFamily="34" charset="0"/>
+                <a:cs typeface="Arial" panose="020B0604020202020204" pitchFamily="34" charset="0"/>
+              </a:rPr>
+              <a:t>FreeBayes</a:t>
+            </a:r>
+            <a:r>
+              <a:rPr lang="en-US" b="0" i="0" dirty="0">
+                <a:solidFill>
+                  <a:srgbClr val="212529"/>
+                </a:solidFill>
+                <a:effectLst/>
+                <a:latin typeface="Arial" panose="020B0604020202020204" pitchFamily="34" charset="0"/>
+                <a:cs typeface="Arial" panose="020B0604020202020204" pitchFamily="34" charset="0"/>
+              </a:rPr>
+              <a:t> is a Bayesian genetic variant detector designed to find small polymorphisms, specifically SNPs (single-nucleotide polymorphisms), indels (insertions and deletions), MNPs (multi-nucleotide polymorphisms), and complex events (composite insertion and substitution events) smaller than the length of a short-read sequencing alignment</a:t>
+            </a:r>
           </a:p>
           <a:p>
             <a:pPr algn="just"/>
             <a:r>
-              <a:rPr lang="en-US" sz="2400" dirty="0">
-                <a:latin typeface="Arial" panose="020B0604020202020204" pitchFamily="34" charset="0"/>
-                <a:cs typeface="Arial" panose="020B0604020202020204" pitchFamily="34" charset="0"/>
-              </a:rPr>
-              <a:t>Merge the VCF files of all samples</a:t>
-            </a:r>
-          </a:p>
-          <a:p>
-            <a:pPr algn="just"/>
-            <a:r>
-              <a:rPr lang="en-US" sz="2400" dirty="0">
-                <a:latin typeface="Arial" panose="020B0604020202020204" pitchFamily="34" charset="0"/>
-                <a:cs typeface="Arial" panose="020B0604020202020204" pitchFamily="34" charset="0"/>
-              </a:rPr>
-              <a:t>Format merged VCF files for further analysis</a:t>
-            </a:r>
-          </a:p>
-          <a:p>
-            <a:pPr algn="just"/>
-            <a:r>
-              <a:rPr lang="en-US" sz="2400" dirty="0">
-                <a:latin typeface="Arial" panose="020B0604020202020204" pitchFamily="34" charset="0"/>
-                <a:cs typeface="Arial" panose="020B0604020202020204" pitchFamily="34" charset="0"/>
-              </a:rPr>
-              <a:t>Annotation of the detected variants</a:t>
+              <a:rPr lang="en-US" dirty="0">
+                <a:solidFill>
+                  <a:srgbClr val="212529"/>
+                </a:solidFill>
+                <a:latin typeface="Arial" panose="020B0604020202020204" pitchFamily="34" charset="0"/>
+                <a:cs typeface="Arial" panose="020B0604020202020204" pitchFamily="34" charset="0"/>
+              </a:rPr>
+              <a:t>Similar software tools include:</a:t>
+            </a:r>
+          </a:p>
+          <a:p>
+            <a:pPr lvl="1" algn="just"/>
+            <a:r>
+              <a:rPr lang="en-US" dirty="0">
+                <a:latin typeface="Arial" panose="020B0604020202020204" pitchFamily="34" charset="0"/>
+                <a:cs typeface="Arial" panose="020B0604020202020204" pitchFamily="34" charset="0"/>
+              </a:rPr>
+              <a:t>GATK HaplotypeCaller</a:t>
+            </a:r>
+          </a:p>
+          <a:p>
+            <a:pPr lvl="1" algn="just"/>
+            <a:r>
+              <a:rPr lang="en-US" dirty="0">
+                <a:latin typeface="Arial" panose="020B0604020202020204" pitchFamily="34" charset="0"/>
+                <a:cs typeface="Arial" panose="020B0604020202020204" pitchFamily="34" charset="0"/>
+              </a:rPr>
+              <a:t>GATK Mutect2 (emphasis on somatic variants)</a:t>
+            </a:r>
+          </a:p>
+          <a:p>
+            <a:pPr lvl="1" algn="just"/>
+            <a:r>
+              <a:rPr lang="en-US" dirty="0">
+                <a:latin typeface="Arial" panose="020B0604020202020204" pitchFamily="34" charset="0"/>
+                <a:cs typeface="Arial" panose="020B0604020202020204" pitchFamily="34" charset="0"/>
+              </a:rPr>
+              <a:t>bcftools</a:t>
+            </a:r>
+          </a:p>
+          <a:p>
+            <a:pPr lvl="1" algn="just"/>
+            <a:r>
+              <a:rPr lang="en-US" dirty="0">
+                <a:latin typeface="Arial" panose="020B0604020202020204" pitchFamily="34" charset="0"/>
+                <a:cs typeface="Arial" panose="020B0604020202020204" pitchFamily="34" charset="0"/>
+              </a:rPr>
+              <a:t>varscan2</a:t>
             </a:r>
           </a:p>
         </p:txBody>
@@ -9281,7 +9392,7 @@
     </p:spTree>
     <p:extLst>
       <p:ext uri="{BB962C8B-B14F-4D97-AF65-F5344CB8AC3E}">
-        <p14:creationId xmlns:p14="http://schemas.microsoft.com/office/powerpoint/2010/main" val="2604484699"/>
+        <p14:creationId xmlns:p14="http://schemas.microsoft.com/office/powerpoint/2010/main" val="2310334249"/>
       </p:ext>
     </p:extLst>
   </p:cSld>
@@ -9313,7 +9424,7 @@
           <p:cNvPr id="2" name="Τίτλος 1">
             <a:extLst>
               <a:ext uri="{FF2B5EF4-FFF2-40B4-BE49-F238E27FC236}">
-                <a16:creationId xmlns:a16="http://schemas.microsoft.com/office/drawing/2014/main" id="{A9187543-90C9-C511-0833-19C8FD701B9B}"/>
+                <a16:creationId xmlns:a16="http://schemas.microsoft.com/office/drawing/2014/main" id="{0E43129F-9F42-F341-FEB7-1407C51429C7}"/>
               </a:ext>
             </a:extLst>
           </p:cNvPr>
@@ -9331,7 +9442,7 @@
           <a:p>
             <a:r>
               <a:rPr lang="en-US" dirty="0"/>
-              <a:t>Steps following Variant detection</a:t>
+              <a:t>VCF format</a:t>
             </a:r>
           </a:p>
         </p:txBody>
@@ -9341,7 +9452,7 @@
           <p:cNvPr id="3" name="Θέση περιεχομένου 2">
             <a:extLst>
               <a:ext uri="{FF2B5EF4-FFF2-40B4-BE49-F238E27FC236}">
-                <a16:creationId xmlns:a16="http://schemas.microsoft.com/office/drawing/2014/main" id="{BC3A2E2C-13F8-1AA1-1F30-400543CA1193}"/>
+                <a16:creationId xmlns:a16="http://schemas.microsoft.com/office/drawing/2014/main" id="{ED2B1580-A463-BB2B-23A0-B06864820052}"/>
               </a:ext>
             </a:extLst>
           </p:cNvPr>
@@ -9352,72 +9463,141 @@
             <p:ph idx="1"/>
           </p:nvPr>
         </p:nvSpPr>
-        <p:spPr/>
+        <p:spPr>
+          <a:xfrm>
+            <a:off x="2592925" y="1773677"/>
+            <a:ext cx="8915400" cy="3777622"/>
+          </a:xfrm>
+        </p:spPr>
         <p:txBody>
-          <a:bodyPr>
-            <a:normAutofit/>
-          </a:bodyPr>
+          <a:bodyPr/>
           <a:lstStyle/>
           <a:p>
             <a:pPr algn="just"/>
             <a:r>
-              <a:rPr lang="en-US" sz="2400" dirty="0">
-                <a:latin typeface="Arial" panose="020B0604020202020204" pitchFamily="34" charset="0"/>
-                <a:cs typeface="Arial" panose="020B0604020202020204" pitchFamily="34" charset="0"/>
-              </a:rPr>
-              <a:t>Compress and index VCF files</a:t>
+              <a:rPr lang="en-US" dirty="0">
+                <a:solidFill>
+                  <a:schemeClr val="tx1"/>
+                </a:solidFill>
+                <a:latin typeface="Arial" panose="020B0604020202020204" pitchFamily="34" charset="0"/>
+                <a:cs typeface="Arial" panose="020B0604020202020204" pitchFamily="34" charset="0"/>
+              </a:rPr>
+              <a:t>VCF is a text file format (most likely stored in a compressed manner). </a:t>
             </a:r>
           </a:p>
           <a:p>
             <a:pPr algn="just"/>
             <a:r>
-              <a:rPr lang="en-US" sz="2400" dirty="0">
-                <a:latin typeface="Arial" panose="020B0604020202020204" pitchFamily="34" charset="0"/>
-                <a:cs typeface="Arial" panose="020B0604020202020204" pitchFamily="34" charset="0"/>
-              </a:rPr>
-              <a:t>Apply filters to the detected variants</a:t>
+              <a:rPr lang="en-US" dirty="0">
+                <a:solidFill>
+                  <a:schemeClr val="tx1"/>
+                </a:solidFill>
+                <a:latin typeface="Arial" panose="020B0604020202020204" pitchFamily="34" charset="0"/>
+                <a:cs typeface="Arial" panose="020B0604020202020204" pitchFamily="34" charset="0"/>
+              </a:rPr>
+              <a:t>It contains meta-information lines, a header line, and then data lines each containing information about a position in the genome. </a:t>
             </a:r>
           </a:p>
           <a:p>
             <a:pPr algn="just"/>
             <a:r>
-              <a:rPr lang="en-US" sz="3200" dirty="0">
-                <a:latin typeface="Arial" panose="020B0604020202020204" pitchFamily="34" charset="0"/>
-                <a:cs typeface="Arial" panose="020B0604020202020204" pitchFamily="34" charset="0"/>
-              </a:rPr>
-              <a:t>Merge the VCF files of all samples</a:t>
-            </a:r>
-            <a:endParaRPr lang="en-US" sz="2400" dirty="0">
+              <a:rPr lang="en-US" dirty="0">
+                <a:solidFill>
+                  <a:schemeClr val="tx1"/>
+                </a:solidFill>
+                <a:latin typeface="Arial" panose="020B0604020202020204" pitchFamily="34" charset="0"/>
+                <a:cs typeface="Arial" panose="020B0604020202020204" pitchFamily="34" charset="0"/>
+              </a:rPr>
+              <a:t>The format also has the ability to contain genotype information on samples for each position.</a:t>
+            </a:r>
+          </a:p>
+          <a:p>
+            <a:pPr algn="just"/>
+            <a:r>
+              <a:rPr lang="en-US" b="0" i="0" dirty="0">
+                <a:solidFill>
+                  <a:schemeClr val="tx1"/>
+                </a:solidFill>
+                <a:effectLst/>
+                <a:latin typeface="Arial" panose="020B0604020202020204" pitchFamily="34" charset="0"/>
+                <a:cs typeface="Arial" panose="020B0604020202020204" pitchFamily="34" charset="0"/>
+              </a:rPr>
+              <a:t>VCF is a preferred format because it is</a:t>
+            </a:r>
+            <a:r>
+              <a:rPr lang="en-US" i="0" dirty="0">
+                <a:solidFill>
+                  <a:schemeClr val="tx1"/>
+                </a:solidFill>
+                <a:effectLst/>
+                <a:latin typeface="Arial" panose="020B0604020202020204" pitchFamily="34" charset="0"/>
+                <a:cs typeface="Arial" panose="020B0604020202020204" pitchFamily="34" charset="0"/>
+              </a:rPr>
+              <a:t> unambiguous, scalable and flexible,</a:t>
+            </a:r>
+            <a:r>
+              <a:rPr lang="en-US" b="0" i="0" dirty="0">
+                <a:solidFill>
+                  <a:schemeClr val="tx1"/>
+                </a:solidFill>
+                <a:effectLst/>
+                <a:latin typeface="Arial" panose="020B0604020202020204" pitchFamily="34" charset="0"/>
+                <a:cs typeface="Arial" panose="020B0604020202020204" pitchFamily="34" charset="0"/>
+              </a:rPr>
+              <a:t> allowing extra information to be added to the info field. </a:t>
+            </a:r>
+          </a:p>
+          <a:p>
+            <a:pPr algn="just"/>
+            <a:r>
+              <a:rPr lang="en-US" b="0" i="0" dirty="0">
+                <a:solidFill>
+                  <a:schemeClr val="tx1"/>
+                </a:solidFill>
+                <a:effectLst/>
+                <a:latin typeface="Arial" panose="020B0604020202020204" pitchFamily="34" charset="0"/>
+                <a:cs typeface="Arial" panose="020B0604020202020204" pitchFamily="34" charset="0"/>
+              </a:rPr>
+              <a:t>Many millions of variants can be stored in a single VCF file.</a:t>
+            </a:r>
+          </a:p>
+          <a:p>
+            <a:pPr algn="just"/>
+            <a:r>
+              <a:rPr lang="en-US" dirty="0">
+                <a:solidFill>
+                  <a:schemeClr val="tx1"/>
+                </a:solidFill>
+                <a:latin typeface="Arial" panose="020B0604020202020204" pitchFamily="34" charset="0"/>
+                <a:cs typeface="Arial" panose="020B0604020202020204" pitchFamily="34" charset="0"/>
+              </a:rPr>
+              <a:t>More detailed information about the VCF format are available here: </a:t>
+            </a:r>
+            <a:r>
+              <a:rPr lang="en-US" dirty="0">
+                <a:solidFill>
+                  <a:schemeClr val="tx1"/>
+                </a:solidFill>
+                <a:latin typeface="Arial" panose="020B0604020202020204" pitchFamily="34" charset="0"/>
+                <a:cs typeface="Arial" panose="020B0604020202020204" pitchFamily="34" charset="0"/>
+                <a:hlinkClick r:id="rId2"/>
+              </a:rPr>
+              <a:t>https://samtools.github.io/hts-specs/VCFv4.2.pdf</a:t>
+            </a:r>
+            <a:endParaRPr lang="en-US" dirty="0">
+              <a:solidFill>
+                <a:schemeClr val="tx1"/>
+              </a:solidFill>
               <a:latin typeface="Arial" panose="020B0604020202020204" pitchFamily="34" charset="0"/>
               <a:cs typeface="Arial" panose="020B0604020202020204" pitchFamily="34" charset="0"/>
             </a:endParaRPr>
           </a:p>
-          <a:p>
-            <a:pPr algn="just"/>
-            <a:r>
-              <a:rPr lang="en-US" sz="2400" dirty="0">
-                <a:latin typeface="Arial" panose="020B0604020202020204" pitchFamily="34" charset="0"/>
-                <a:cs typeface="Arial" panose="020B0604020202020204" pitchFamily="34" charset="0"/>
-              </a:rPr>
-              <a:t>Format merged VCF files for further analysis</a:t>
-            </a:r>
-          </a:p>
-          <a:p>
-            <a:pPr algn="just"/>
-            <a:r>
-              <a:rPr lang="en-US" sz="2400" dirty="0">
-                <a:latin typeface="Arial" panose="020B0604020202020204" pitchFamily="34" charset="0"/>
-                <a:cs typeface="Arial" panose="020B0604020202020204" pitchFamily="34" charset="0"/>
-              </a:rPr>
-              <a:t>Annotation of the detected variants</a:t>
-            </a:r>
-          </a:p>
         </p:txBody>
       </p:sp>
     </p:spTree>
     <p:extLst>
       <p:ext uri="{BB962C8B-B14F-4D97-AF65-F5344CB8AC3E}">
-        <p14:creationId xmlns:p14="http://schemas.microsoft.com/office/powerpoint/2010/main" val="2020414742"/>
+        <p14:creationId xmlns:p14="http://schemas.microsoft.com/office/powerpoint/2010/main" val="3040801966"/>
       </p:ext>
     </p:extLst>
   </p:cSld>
@@ -9449,7 +9629,7 @@
           <p:cNvPr id="2" name="Τίτλος 1">
             <a:extLst>
               <a:ext uri="{FF2B5EF4-FFF2-40B4-BE49-F238E27FC236}">
-                <a16:creationId xmlns:a16="http://schemas.microsoft.com/office/drawing/2014/main" id="{A9187543-90C9-C511-0833-19C8FD701B9B}"/>
+                <a16:creationId xmlns:a16="http://schemas.microsoft.com/office/drawing/2014/main" id="{0E43129F-9F42-F341-FEB7-1407C51429C7}"/>
               </a:ext>
             </a:extLst>
           </p:cNvPr>
@@ -9467,93 +9647,50 @@
           <a:p>
             <a:r>
               <a:rPr lang="en-US" dirty="0"/>
-              <a:t>Steps following Variant detection</a:t>
+              <a:t>VCF format</a:t>
             </a:r>
           </a:p>
         </p:txBody>
       </p:sp>
-      <p:sp>
-        <p:nvSpPr>
-          <p:cNvPr id="3" name="Θέση περιεχομένου 2">
+      <p:pic>
+        <p:nvPicPr>
+          <p:cNvPr id="5" name="Εικόνα 4">
             <a:extLst>
               <a:ext uri="{FF2B5EF4-FFF2-40B4-BE49-F238E27FC236}">
-                <a16:creationId xmlns:a16="http://schemas.microsoft.com/office/drawing/2014/main" id="{BC3A2E2C-13F8-1AA1-1F30-400543CA1193}"/>
+                <a16:creationId xmlns:a16="http://schemas.microsoft.com/office/drawing/2014/main" id="{F1572D28-A9AF-F3C4-62F0-09132CEF3DD6}"/>
               </a:ext>
             </a:extLst>
           </p:cNvPr>
-          <p:cNvSpPr>
-            <a:spLocks noGrp="1"/>
-          </p:cNvSpPr>
-          <p:nvPr>
-            <p:ph idx="1"/>
-          </p:nvPr>
-        </p:nvSpPr>
-        <p:spPr/>
-        <p:txBody>
-          <a:bodyPr>
-            <a:normAutofit/>
-          </a:bodyPr>
-          <a:lstStyle/>
-          <a:p>
-            <a:pPr algn="just"/>
-            <a:r>
-              <a:rPr lang="en-US" sz="2400" dirty="0">
-                <a:latin typeface="Arial" panose="020B0604020202020204" pitchFamily="34" charset="0"/>
-                <a:cs typeface="Arial" panose="020B0604020202020204" pitchFamily="34" charset="0"/>
-              </a:rPr>
-              <a:t>Compress and index VCF files</a:t>
-            </a:r>
-          </a:p>
-          <a:p>
-            <a:pPr algn="just"/>
-            <a:r>
-              <a:rPr lang="en-US" sz="2400" dirty="0">
-                <a:latin typeface="Arial" panose="020B0604020202020204" pitchFamily="34" charset="0"/>
-                <a:cs typeface="Arial" panose="020B0604020202020204" pitchFamily="34" charset="0"/>
-              </a:rPr>
-              <a:t>Apply filters to the detected variants</a:t>
-            </a:r>
-          </a:p>
-          <a:p>
-            <a:pPr algn="just"/>
-            <a:r>
-              <a:rPr lang="en-US" sz="2400" dirty="0">
-                <a:latin typeface="Arial" panose="020B0604020202020204" pitchFamily="34" charset="0"/>
-                <a:cs typeface="Arial" panose="020B0604020202020204" pitchFamily="34" charset="0"/>
-              </a:rPr>
-              <a:t>Merge the VCF files of all samples</a:t>
-            </a:r>
-          </a:p>
-          <a:p>
-            <a:pPr algn="just"/>
-            <a:r>
-              <a:rPr lang="en-US" sz="3200" dirty="0">
-                <a:latin typeface="Arial" panose="020B0604020202020204" pitchFamily="34" charset="0"/>
-                <a:cs typeface="Arial" panose="020B0604020202020204" pitchFamily="34" charset="0"/>
-              </a:rPr>
-              <a:t>Format merged VCF files for further analysis</a:t>
-            </a:r>
-            <a:endParaRPr lang="en-US" sz="2400" dirty="0">
-              <a:latin typeface="Arial" panose="020B0604020202020204" pitchFamily="34" charset="0"/>
-              <a:cs typeface="Arial" panose="020B0604020202020204" pitchFamily="34" charset="0"/>
-            </a:endParaRPr>
-          </a:p>
-          <a:p>
-            <a:pPr algn="just"/>
-            <a:r>
-              <a:rPr lang="en-US" sz="2400" dirty="0">
-                <a:latin typeface="Arial" panose="020B0604020202020204" pitchFamily="34" charset="0"/>
-                <a:cs typeface="Arial" panose="020B0604020202020204" pitchFamily="34" charset="0"/>
-              </a:rPr>
-              <a:t>Annotation of the detected variants</a:t>
-            </a:r>
-          </a:p>
-        </p:txBody>
-      </p:sp>
+          <p:cNvPicPr>
+            <a:picLocks noChangeAspect="1"/>
+          </p:cNvPicPr>
+          <p:nvPr/>
+        </p:nvPicPr>
+        <p:blipFill>
+          <a:blip r:embed="rId2"/>
+          <a:stretch>
+            <a:fillRect/>
+          </a:stretch>
+        </p:blipFill>
+        <p:spPr>
+          <a:xfrm>
+            <a:off x="484063" y="1905000"/>
+            <a:ext cx="11223874" cy="4131749"/>
+          </a:xfrm>
+          <a:prstGeom prst="rect">
+            <a:avLst/>
+          </a:prstGeom>
+          <a:ln>
+            <a:solidFill>
+              <a:schemeClr val="tx1"/>
+            </a:solidFill>
+          </a:ln>
+        </p:spPr>
+      </p:pic>
     </p:spTree>
     <p:extLst>
       <p:ext uri="{BB962C8B-B14F-4D97-AF65-F5344CB8AC3E}">
-        <p14:creationId xmlns:p14="http://schemas.microsoft.com/office/powerpoint/2010/main" val="2236015547"/>
+        <p14:creationId xmlns:p14="http://schemas.microsoft.com/office/powerpoint/2010/main" val="362642714"/>
       </p:ext>
     </p:extLst>
   </p:cSld>
@@ -9885,63 +10022,63 @@
           <a:p>
             <a:pPr algn="just"/>
             <a:r>
-              <a:rPr lang="en-US" sz="2400" dirty="0">
+              <a:rPr lang="en-US" sz="3200" dirty="0">
                 <a:latin typeface="Arial" panose="020B0604020202020204" pitchFamily="34" charset="0"/>
                 <a:cs typeface="Arial" panose="020B0604020202020204" pitchFamily="34" charset="0"/>
               </a:rPr>
               <a:t>Compress and index VCF files</a:t>
-            </a:r>
-          </a:p>
-          <a:p>
-            <a:pPr algn="just"/>
-            <a:r>
-              <a:rPr lang="en-US" sz="2400" dirty="0">
-                <a:latin typeface="Arial" panose="020B0604020202020204" pitchFamily="34" charset="0"/>
-                <a:cs typeface="Arial" panose="020B0604020202020204" pitchFamily="34" charset="0"/>
-              </a:rPr>
-              <a:t>Apply filters to the detected variants</a:t>
-            </a:r>
-          </a:p>
-          <a:p>
-            <a:pPr algn="just"/>
-            <a:r>
-              <a:rPr lang="en-US" sz="2400" dirty="0">
-                <a:latin typeface="Arial" panose="020B0604020202020204" pitchFamily="34" charset="0"/>
-                <a:cs typeface="Arial" panose="020B0604020202020204" pitchFamily="34" charset="0"/>
-              </a:rPr>
-              <a:t>Merge the VCF files of all samples</a:t>
-            </a:r>
-          </a:p>
-          <a:p>
-            <a:pPr algn="just"/>
-            <a:r>
-              <a:rPr lang="en-US" sz="2400" dirty="0">
-                <a:latin typeface="Arial" panose="020B0604020202020204" pitchFamily="34" charset="0"/>
-                <a:cs typeface="Arial" panose="020B0604020202020204" pitchFamily="34" charset="0"/>
-              </a:rPr>
-              <a:t>Format merged VCF files for further analysis</a:t>
-            </a:r>
-          </a:p>
-          <a:p>
-            <a:pPr algn="just"/>
-            <a:r>
-              <a:rPr lang="en-US" sz="3200" dirty="0">
-                <a:latin typeface="Arial" panose="020B0604020202020204" pitchFamily="34" charset="0"/>
-                <a:cs typeface="Arial" panose="020B0604020202020204" pitchFamily="34" charset="0"/>
-              </a:rPr>
-              <a:t>Annotation of the detected variants</a:t>
             </a:r>
             <a:endParaRPr lang="en-US" sz="2400" dirty="0">
               <a:latin typeface="Arial" panose="020B0604020202020204" pitchFamily="34" charset="0"/>
               <a:cs typeface="Arial" panose="020B0604020202020204" pitchFamily="34" charset="0"/>
             </a:endParaRPr>
           </a:p>
+          <a:p>
+            <a:pPr algn="just"/>
+            <a:r>
+              <a:rPr lang="en-US" sz="2400" dirty="0">
+                <a:latin typeface="Arial" panose="020B0604020202020204" pitchFamily="34" charset="0"/>
+                <a:cs typeface="Arial" panose="020B0604020202020204" pitchFamily="34" charset="0"/>
+              </a:rPr>
+              <a:t>Apply filters to the detected variants</a:t>
+            </a:r>
+          </a:p>
+          <a:p>
+            <a:pPr algn="just"/>
+            <a:r>
+              <a:rPr lang="en-US" sz="2400" dirty="0">
+                <a:latin typeface="Arial" panose="020B0604020202020204" pitchFamily="34" charset="0"/>
+                <a:cs typeface="Arial" panose="020B0604020202020204" pitchFamily="34" charset="0"/>
+              </a:rPr>
+              <a:t>Merge the VCF files of all samples</a:t>
+            </a:r>
+          </a:p>
+          <a:p>
+            <a:pPr algn="just"/>
+            <a:r>
+              <a:rPr lang="en-US" sz="2400" dirty="0">
+                <a:latin typeface="Arial" panose="020B0604020202020204" pitchFamily="34" charset="0"/>
+                <a:cs typeface="Arial" panose="020B0604020202020204" pitchFamily="34" charset="0"/>
+              </a:rPr>
+              <a:t>Format merged VCF files for further analysis</a:t>
+            </a:r>
+          </a:p>
+          <a:p>
+            <a:pPr algn="just"/>
+            <a:r>
+              <a:rPr lang="en-US" sz="2400" dirty="0">
+                <a:latin typeface="Arial" panose="020B0604020202020204" pitchFamily="34" charset="0"/>
+                <a:cs typeface="Arial" panose="020B0604020202020204" pitchFamily="34" charset="0"/>
+              </a:rPr>
+              <a:t>Annotation of the detected variants</a:t>
+            </a:r>
+          </a:p>
         </p:txBody>
       </p:sp>
     </p:spTree>
     <p:extLst>
       <p:ext uri="{BB962C8B-B14F-4D97-AF65-F5344CB8AC3E}">
-        <p14:creationId xmlns:p14="http://schemas.microsoft.com/office/powerpoint/2010/main" val="2358543633"/>
+        <p14:creationId xmlns:p14="http://schemas.microsoft.com/office/powerpoint/2010/main" val="2848649862"/>
       </p:ext>
     </p:extLst>
   </p:cSld>
@@ -9973,6 +10110,550 @@
           <p:cNvPr id="2" name="Τίτλος 1">
             <a:extLst>
               <a:ext uri="{FF2B5EF4-FFF2-40B4-BE49-F238E27FC236}">
+                <a16:creationId xmlns:a16="http://schemas.microsoft.com/office/drawing/2014/main" id="{A9187543-90C9-C511-0833-19C8FD701B9B}"/>
+              </a:ext>
+            </a:extLst>
+          </p:cNvPr>
+          <p:cNvSpPr>
+            <a:spLocks noGrp="1"/>
+          </p:cNvSpPr>
+          <p:nvPr>
+            <p:ph type="title"/>
+          </p:nvPr>
+        </p:nvSpPr>
+        <p:spPr/>
+        <p:txBody>
+          <a:bodyPr/>
+          <a:lstStyle/>
+          <a:p>
+            <a:r>
+              <a:rPr lang="en-US" dirty="0"/>
+              <a:t>Steps following Variant detection</a:t>
+            </a:r>
+          </a:p>
+        </p:txBody>
+      </p:sp>
+      <p:sp>
+        <p:nvSpPr>
+          <p:cNvPr id="3" name="Θέση περιεχομένου 2">
+            <a:extLst>
+              <a:ext uri="{FF2B5EF4-FFF2-40B4-BE49-F238E27FC236}">
+                <a16:creationId xmlns:a16="http://schemas.microsoft.com/office/drawing/2014/main" id="{BC3A2E2C-13F8-1AA1-1F30-400543CA1193}"/>
+              </a:ext>
+            </a:extLst>
+          </p:cNvPr>
+          <p:cNvSpPr>
+            <a:spLocks noGrp="1"/>
+          </p:cNvSpPr>
+          <p:nvPr>
+            <p:ph idx="1"/>
+          </p:nvPr>
+        </p:nvSpPr>
+        <p:spPr/>
+        <p:txBody>
+          <a:bodyPr>
+            <a:normAutofit/>
+          </a:bodyPr>
+          <a:lstStyle/>
+          <a:p>
+            <a:pPr algn="just"/>
+            <a:r>
+              <a:rPr lang="en-US" sz="2400" dirty="0">
+                <a:latin typeface="Arial" panose="020B0604020202020204" pitchFamily="34" charset="0"/>
+                <a:cs typeface="Arial" panose="020B0604020202020204" pitchFamily="34" charset="0"/>
+              </a:rPr>
+              <a:t>Compress and index VCF files</a:t>
+            </a:r>
+          </a:p>
+          <a:p>
+            <a:pPr algn="just"/>
+            <a:r>
+              <a:rPr lang="en-US" sz="3200" dirty="0">
+                <a:latin typeface="Arial" panose="020B0604020202020204" pitchFamily="34" charset="0"/>
+                <a:cs typeface="Arial" panose="020B0604020202020204" pitchFamily="34" charset="0"/>
+              </a:rPr>
+              <a:t>Apply filters to the detected variants</a:t>
+            </a:r>
+            <a:endParaRPr lang="en-US" sz="2400" dirty="0">
+              <a:latin typeface="Arial" panose="020B0604020202020204" pitchFamily="34" charset="0"/>
+              <a:cs typeface="Arial" panose="020B0604020202020204" pitchFamily="34" charset="0"/>
+            </a:endParaRPr>
+          </a:p>
+          <a:p>
+            <a:pPr algn="just"/>
+            <a:r>
+              <a:rPr lang="en-US" sz="2400" dirty="0">
+                <a:latin typeface="Arial" panose="020B0604020202020204" pitchFamily="34" charset="0"/>
+                <a:cs typeface="Arial" panose="020B0604020202020204" pitchFamily="34" charset="0"/>
+              </a:rPr>
+              <a:t>Merge the VCF files of all samples</a:t>
+            </a:r>
+          </a:p>
+          <a:p>
+            <a:pPr algn="just"/>
+            <a:r>
+              <a:rPr lang="en-US" sz="2400" dirty="0">
+                <a:latin typeface="Arial" panose="020B0604020202020204" pitchFamily="34" charset="0"/>
+                <a:cs typeface="Arial" panose="020B0604020202020204" pitchFamily="34" charset="0"/>
+              </a:rPr>
+              <a:t>Format merged VCF files for further analysis</a:t>
+            </a:r>
+          </a:p>
+          <a:p>
+            <a:pPr algn="just"/>
+            <a:r>
+              <a:rPr lang="en-US" sz="2400" dirty="0">
+                <a:latin typeface="Arial" panose="020B0604020202020204" pitchFamily="34" charset="0"/>
+                <a:cs typeface="Arial" panose="020B0604020202020204" pitchFamily="34" charset="0"/>
+              </a:rPr>
+              <a:t>Annotation of the detected variants</a:t>
+            </a:r>
+          </a:p>
+        </p:txBody>
+      </p:sp>
+    </p:spTree>
+    <p:extLst>
+      <p:ext uri="{BB962C8B-B14F-4D97-AF65-F5344CB8AC3E}">
+        <p14:creationId xmlns:p14="http://schemas.microsoft.com/office/powerpoint/2010/main" val="2604484699"/>
+      </p:ext>
+    </p:extLst>
+  </p:cSld>
+  <p:clrMapOvr>
+    <a:masterClrMapping/>
+  </p:clrMapOvr>
+</p:sld>
+</file>
+
+<file path=ppt/slides/slide22.xml><?xml version="1.0" encoding="utf-8"?>
+<p:sld xmlns:a="http://schemas.openxmlformats.org/drawingml/2006/main" xmlns:r="http://schemas.openxmlformats.org/officeDocument/2006/relationships" xmlns:p="http://schemas.openxmlformats.org/presentationml/2006/main">
+  <p:cSld>
+    <p:spTree>
+      <p:nvGrpSpPr>
+        <p:cNvPr id="1" name=""/>
+        <p:cNvGrpSpPr/>
+        <p:nvPr/>
+      </p:nvGrpSpPr>
+      <p:grpSpPr>
+        <a:xfrm>
+          <a:off x="0" y="0"/>
+          <a:ext cx="0" cy="0"/>
+          <a:chOff x="0" y="0"/>
+          <a:chExt cx="0" cy="0"/>
+        </a:xfrm>
+      </p:grpSpPr>
+      <p:sp>
+        <p:nvSpPr>
+          <p:cNvPr id="2" name="Τίτλος 1">
+            <a:extLst>
+              <a:ext uri="{FF2B5EF4-FFF2-40B4-BE49-F238E27FC236}">
+                <a16:creationId xmlns:a16="http://schemas.microsoft.com/office/drawing/2014/main" id="{A9187543-90C9-C511-0833-19C8FD701B9B}"/>
+              </a:ext>
+            </a:extLst>
+          </p:cNvPr>
+          <p:cNvSpPr>
+            <a:spLocks noGrp="1"/>
+          </p:cNvSpPr>
+          <p:nvPr>
+            <p:ph type="title"/>
+          </p:nvPr>
+        </p:nvSpPr>
+        <p:spPr/>
+        <p:txBody>
+          <a:bodyPr/>
+          <a:lstStyle/>
+          <a:p>
+            <a:r>
+              <a:rPr lang="en-US" dirty="0"/>
+              <a:t>Steps following Variant detection</a:t>
+            </a:r>
+          </a:p>
+        </p:txBody>
+      </p:sp>
+      <p:sp>
+        <p:nvSpPr>
+          <p:cNvPr id="3" name="Θέση περιεχομένου 2">
+            <a:extLst>
+              <a:ext uri="{FF2B5EF4-FFF2-40B4-BE49-F238E27FC236}">
+                <a16:creationId xmlns:a16="http://schemas.microsoft.com/office/drawing/2014/main" id="{BC3A2E2C-13F8-1AA1-1F30-400543CA1193}"/>
+              </a:ext>
+            </a:extLst>
+          </p:cNvPr>
+          <p:cNvSpPr>
+            <a:spLocks noGrp="1"/>
+          </p:cNvSpPr>
+          <p:nvPr>
+            <p:ph idx="1"/>
+          </p:nvPr>
+        </p:nvSpPr>
+        <p:spPr/>
+        <p:txBody>
+          <a:bodyPr>
+            <a:normAutofit/>
+          </a:bodyPr>
+          <a:lstStyle/>
+          <a:p>
+            <a:pPr algn="just"/>
+            <a:r>
+              <a:rPr lang="en-US" sz="2400" dirty="0">
+                <a:latin typeface="Arial" panose="020B0604020202020204" pitchFamily="34" charset="0"/>
+                <a:cs typeface="Arial" panose="020B0604020202020204" pitchFamily="34" charset="0"/>
+              </a:rPr>
+              <a:t>Compress and index VCF files</a:t>
+            </a:r>
+          </a:p>
+          <a:p>
+            <a:pPr algn="just"/>
+            <a:r>
+              <a:rPr lang="en-US" sz="2400" dirty="0">
+                <a:latin typeface="Arial" panose="020B0604020202020204" pitchFamily="34" charset="0"/>
+                <a:cs typeface="Arial" panose="020B0604020202020204" pitchFamily="34" charset="0"/>
+              </a:rPr>
+              <a:t>Apply filters to the detected variants</a:t>
+            </a:r>
+          </a:p>
+          <a:p>
+            <a:pPr algn="just"/>
+            <a:r>
+              <a:rPr lang="en-US" sz="3200" dirty="0">
+                <a:latin typeface="Arial" panose="020B0604020202020204" pitchFamily="34" charset="0"/>
+                <a:cs typeface="Arial" panose="020B0604020202020204" pitchFamily="34" charset="0"/>
+              </a:rPr>
+              <a:t>Merge the VCF files of all samples</a:t>
+            </a:r>
+            <a:endParaRPr lang="en-US" sz="2400" dirty="0">
+              <a:latin typeface="Arial" panose="020B0604020202020204" pitchFamily="34" charset="0"/>
+              <a:cs typeface="Arial" panose="020B0604020202020204" pitchFamily="34" charset="0"/>
+            </a:endParaRPr>
+          </a:p>
+          <a:p>
+            <a:pPr algn="just"/>
+            <a:r>
+              <a:rPr lang="en-US" sz="2400" dirty="0">
+                <a:latin typeface="Arial" panose="020B0604020202020204" pitchFamily="34" charset="0"/>
+                <a:cs typeface="Arial" panose="020B0604020202020204" pitchFamily="34" charset="0"/>
+              </a:rPr>
+              <a:t>Format merged VCF files for further analysis</a:t>
+            </a:r>
+          </a:p>
+          <a:p>
+            <a:pPr algn="just"/>
+            <a:r>
+              <a:rPr lang="en-US" sz="2400" dirty="0">
+                <a:latin typeface="Arial" panose="020B0604020202020204" pitchFamily="34" charset="0"/>
+                <a:cs typeface="Arial" panose="020B0604020202020204" pitchFamily="34" charset="0"/>
+              </a:rPr>
+              <a:t>Annotation of the detected variants</a:t>
+            </a:r>
+          </a:p>
+        </p:txBody>
+      </p:sp>
+    </p:spTree>
+    <p:extLst>
+      <p:ext uri="{BB962C8B-B14F-4D97-AF65-F5344CB8AC3E}">
+        <p14:creationId xmlns:p14="http://schemas.microsoft.com/office/powerpoint/2010/main" val="2020414742"/>
+      </p:ext>
+    </p:extLst>
+  </p:cSld>
+  <p:clrMapOvr>
+    <a:masterClrMapping/>
+  </p:clrMapOvr>
+</p:sld>
+</file>
+
+<file path=ppt/slides/slide23.xml><?xml version="1.0" encoding="utf-8"?>
+<p:sld xmlns:a="http://schemas.openxmlformats.org/drawingml/2006/main" xmlns:r="http://schemas.openxmlformats.org/officeDocument/2006/relationships" xmlns:p="http://schemas.openxmlformats.org/presentationml/2006/main">
+  <p:cSld>
+    <p:spTree>
+      <p:nvGrpSpPr>
+        <p:cNvPr id="1" name=""/>
+        <p:cNvGrpSpPr/>
+        <p:nvPr/>
+      </p:nvGrpSpPr>
+      <p:grpSpPr>
+        <a:xfrm>
+          <a:off x="0" y="0"/>
+          <a:ext cx="0" cy="0"/>
+          <a:chOff x="0" y="0"/>
+          <a:chExt cx="0" cy="0"/>
+        </a:xfrm>
+      </p:grpSpPr>
+      <p:sp>
+        <p:nvSpPr>
+          <p:cNvPr id="2" name="Τίτλος 1">
+            <a:extLst>
+              <a:ext uri="{FF2B5EF4-FFF2-40B4-BE49-F238E27FC236}">
+                <a16:creationId xmlns:a16="http://schemas.microsoft.com/office/drawing/2014/main" id="{A9187543-90C9-C511-0833-19C8FD701B9B}"/>
+              </a:ext>
+            </a:extLst>
+          </p:cNvPr>
+          <p:cNvSpPr>
+            <a:spLocks noGrp="1"/>
+          </p:cNvSpPr>
+          <p:nvPr>
+            <p:ph type="title"/>
+          </p:nvPr>
+        </p:nvSpPr>
+        <p:spPr/>
+        <p:txBody>
+          <a:bodyPr/>
+          <a:lstStyle/>
+          <a:p>
+            <a:r>
+              <a:rPr lang="en-US" dirty="0"/>
+              <a:t>Steps following Variant detection</a:t>
+            </a:r>
+          </a:p>
+        </p:txBody>
+      </p:sp>
+      <p:sp>
+        <p:nvSpPr>
+          <p:cNvPr id="3" name="Θέση περιεχομένου 2">
+            <a:extLst>
+              <a:ext uri="{FF2B5EF4-FFF2-40B4-BE49-F238E27FC236}">
+                <a16:creationId xmlns:a16="http://schemas.microsoft.com/office/drawing/2014/main" id="{BC3A2E2C-13F8-1AA1-1F30-400543CA1193}"/>
+              </a:ext>
+            </a:extLst>
+          </p:cNvPr>
+          <p:cNvSpPr>
+            <a:spLocks noGrp="1"/>
+          </p:cNvSpPr>
+          <p:nvPr>
+            <p:ph idx="1"/>
+          </p:nvPr>
+        </p:nvSpPr>
+        <p:spPr/>
+        <p:txBody>
+          <a:bodyPr>
+            <a:normAutofit/>
+          </a:bodyPr>
+          <a:lstStyle/>
+          <a:p>
+            <a:pPr algn="just"/>
+            <a:r>
+              <a:rPr lang="en-US" sz="2400" dirty="0">
+                <a:latin typeface="Arial" panose="020B0604020202020204" pitchFamily="34" charset="0"/>
+                <a:cs typeface="Arial" panose="020B0604020202020204" pitchFamily="34" charset="0"/>
+              </a:rPr>
+              <a:t>Compress and index VCF files</a:t>
+            </a:r>
+          </a:p>
+          <a:p>
+            <a:pPr algn="just"/>
+            <a:r>
+              <a:rPr lang="en-US" sz="2400" dirty="0">
+                <a:latin typeface="Arial" panose="020B0604020202020204" pitchFamily="34" charset="0"/>
+                <a:cs typeface="Arial" panose="020B0604020202020204" pitchFamily="34" charset="0"/>
+              </a:rPr>
+              <a:t>Apply filters to the detected variants</a:t>
+            </a:r>
+          </a:p>
+          <a:p>
+            <a:pPr algn="just"/>
+            <a:r>
+              <a:rPr lang="en-US" sz="2400" dirty="0">
+                <a:latin typeface="Arial" panose="020B0604020202020204" pitchFamily="34" charset="0"/>
+                <a:cs typeface="Arial" panose="020B0604020202020204" pitchFamily="34" charset="0"/>
+              </a:rPr>
+              <a:t>Merge the VCF files of all samples</a:t>
+            </a:r>
+          </a:p>
+          <a:p>
+            <a:pPr algn="just"/>
+            <a:r>
+              <a:rPr lang="en-US" sz="3200" dirty="0">
+                <a:latin typeface="Arial" panose="020B0604020202020204" pitchFamily="34" charset="0"/>
+                <a:cs typeface="Arial" panose="020B0604020202020204" pitchFamily="34" charset="0"/>
+              </a:rPr>
+              <a:t>Format merged VCF files for further analysis</a:t>
+            </a:r>
+            <a:endParaRPr lang="en-US" sz="2400" dirty="0">
+              <a:latin typeface="Arial" panose="020B0604020202020204" pitchFamily="34" charset="0"/>
+              <a:cs typeface="Arial" panose="020B0604020202020204" pitchFamily="34" charset="0"/>
+            </a:endParaRPr>
+          </a:p>
+          <a:p>
+            <a:pPr algn="just"/>
+            <a:r>
+              <a:rPr lang="en-US" sz="2400" dirty="0">
+                <a:latin typeface="Arial" panose="020B0604020202020204" pitchFamily="34" charset="0"/>
+                <a:cs typeface="Arial" panose="020B0604020202020204" pitchFamily="34" charset="0"/>
+              </a:rPr>
+              <a:t>Annotation of the detected variants</a:t>
+            </a:r>
+          </a:p>
+        </p:txBody>
+      </p:sp>
+    </p:spTree>
+    <p:extLst>
+      <p:ext uri="{BB962C8B-B14F-4D97-AF65-F5344CB8AC3E}">
+        <p14:creationId xmlns:p14="http://schemas.microsoft.com/office/powerpoint/2010/main" val="2236015547"/>
+      </p:ext>
+    </p:extLst>
+  </p:cSld>
+  <p:clrMapOvr>
+    <a:masterClrMapping/>
+  </p:clrMapOvr>
+</p:sld>
+</file>
+
+<file path=ppt/slides/slide24.xml><?xml version="1.0" encoding="utf-8"?>
+<p:sld xmlns:a="http://schemas.openxmlformats.org/drawingml/2006/main" xmlns:r="http://schemas.openxmlformats.org/officeDocument/2006/relationships" xmlns:p="http://schemas.openxmlformats.org/presentationml/2006/main">
+  <p:cSld>
+    <p:spTree>
+      <p:nvGrpSpPr>
+        <p:cNvPr id="1" name=""/>
+        <p:cNvGrpSpPr/>
+        <p:nvPr/>
+      </p:nvGrpSpPr>
+      <p:grpSpPr>
+        <a:xfrm>
+          <a:off x="0" y="0"/>
+          <a:ext cx="0" cy="0"/>
+          <a:chOff x="0" y="0"/>
+          <a:chExt cx="0" cy="0"/>
+        </a:xfrm>
+      </p:grpSpPr>
+      <p:sp>
+        <p:nvSpPr>
+          <p:cNvPr id="2" name="Τίτλος 1">
+            <a:extLst>
+              <a:ext uri="{FF2B5EF4-FFF2-40B4-BE49-F238E27FC236}">
+                <a16:creationId xmlns:a16="http://schemas.microsoft.com/office/drawing/2014/main" id="{A9187543-90C9-C511-0833-19C8FD701B9B}"/>
+              </a:ext>
+            </a:extLst>
+          </p:cNvPr>
+          <p:cNvSpPr>
+            <a:spLocks noGrp="1"/>
+          </p:cNvSpPr>
+          <p:nvPr>
+            <p:ph type="title"/>
+          </p:nvPr>
+        </p:nvSpPr>
+        <p:spPr/>
+        <p:txBody>
+          <a:bodyPr/>
+          <a:lstStyle/>
+          <a:p>
+            <a:r>
+              <a:rPr lang="en-US" dirty="0"/>
+              <a:t>Steps following Variant detection</a:t>
+            </a:r>
+          </a:p>
+        </p:txBody>
+      </p:sp>
+      <p:sp>
+        <p:nvSpPr>
+          <p:cNvPr id="3" name="Θέση περιεχομένου 2">
+            <a:extLst>
+              <a:ext uri="{FF2B5EF4-FFF2-40B4-BE49-F238E27FC236}">
+                <a16:creationId xmlns:a16="http://schemas.microsoft.com/office/drawing/2014/main" id="{BC3A2E2C-13F8-1AA1-1F30-400543CA1193}"/>
+              </a:ext>
+            </a:extLst>
+          </p:cNvPr>
+          <p:cNvSpPr>
+            <a:spLocks noGrp="1"/>
+          </p:cNvSpPr>
+          <p:nvPr>
+            <p:ph idx="1"/>
+          </p:nvPr>
+        </p:nvSpPr>
+        <p:spPr/>
+        <p:txBody>
+          <a:bodyPr>
+            <a:normAutofit/>
+          </a:bodyPr>
+          <a:lstStyle/>
+          <a:p>
+            <a:pPr algn="just"/>
+            <a:r>
+              <a:rPr lang="en-US" sz="2400" dirty="0">
+                <a:latin typeface="Arial" panose="020B0604020202020204" pitchFamily="34" charset="0"/>
+                <a:cs typeface="Arial" panose="020B0604020202020204" pitchFamily="34" charset="0"/>
+              </a:rPr>
+              <a:t>Compress and index VCF files</a:t>
+            </a:r>
+          </a:p>
+          <a:p>
+            <a:pPr algn="just"/>
+            <a:r>
+              <a:rPr lang="en-US" sz="2400" dirty="0">
+                <a:latin typeface="Arial" panose="020B0604020202020204" pitchFamily="34" charset="0"/>
+                <a:cs typeface="Arial" panose="020B0604020202020204" pitchFamily="34" charset="0"/>
+              </a:rPr>
+              <a:t>Apply filters to the detected variants</a:t>
+            </a:r>
+          </a:p>
+          <a:p>
+            <a:pPr algn="just"/>
+            <a:r>
+              <a:rPr lang="en-US" sz="2400" dirty="0">
+                <a:latin typeface="Arial" panose="020B0604020202020204" pitchFamily="34" charset="0"/>
+                <a:cs typeface="Arial" panose="020B0604020202020204" pitchFamily="34" charset="0"/>
+              </a:rPr>
+              <a:t>Merge the VCF files of all samples</a:t>
+            </a:r>
+          </a:p>
+          <a:p>
+            <a:pPr algn="just"/>
+            <a:r>
+              <a:rPr lang="en-US" sz="2400" dirty="0">
+                <a:latin typeface="Arial" panose="020B0604020202020204" pitchFamily="34" charset="0"/>
+                <a:cs typeface="Arial" panose="020B0604020202020204" pitchFamily="34" charset="0"/>
+              </a:rPr>
+              <a:t>Format merged VCF files for further analysis</a:t>
+            </a:r>
+          </a:p>
+          <a:p>
+            <a:pPr algn="just"/>
+            <a:r>
+              <a:rPr lang="en-US" sz="3200" dirty="0">
+                <a:latin typeface="Arial" panose="020B0604020202020204" pitchFamily="34" charset="0"/>
+                <a:cs typeface="Arial" panose="020B0604020202020204" pitchFamily="34" charset="0"/>
+              </a:rPr>
+              <a:t>Annotation of the detected variants</a:t>
+            </a:r>
+            <a:endParaRPr lang="en-US" sz="2400" dirty="0">
+              <a:latin typeface="Arial" panose="020B0604020202020204" pitchFamily="34" charset="0"/>
+              <a:cs typeface="Arial" panose="020B0604020202020204" pitchFamily="34" charset="0"/>
+            </a:endParaRPr>
+          </a:p>
+        </p:txBody>
+      </p:sp>
+    </p:spTree>
+    <p:extLst>
+      <p:ext uri="{BB962C8B-B14F-4D97-AF65-F5344CB8AC3E}">
+        <p14:creationId xmlns:p14="http://schemas.microsoft.com/office/powerpoint/2010/main" val="2358543633"/>
+      </p:ext>
+    </p:extLst>
+  </p:cSld>
+  <p:clrMapOvr>
+    <a:masterClrMapping/>
+  </p:clrMapOvr>
+</p:sld>
+</file>
+
+<file path=ppt/slides/slide25.xml><?xml version="1.0" encoding="utf-8"?>
+<p:sld xmlns:a="http://schemas.openxmlformats.org/drawingml/2006/main" xmlns:r="http://schemas.openxmlformats.org/officeDocument/2006/relationships" xmlns:p="http://schemas.openxmlformats.org/presentationml/2006/main">
+  <p:cSld>
+    <p:spTree>
+      <p:nvGrpSpPr>
+        <p:cNvPr id="1" name=""/>
+        <p:cNvGrpSpPr/>
+        <p:nvPr/>
+      </p:nvGrpSpPr>
+      <p:grpSpPr>
+        <a:xfrm>
+          <a:off x="0" y="0"/>
+          <a:ext cx="0" cy="0"/>
+          <a:chOff x="0" y="0"/>
+          <a:chExt cx="0" cy="0"/>
+        </a:xfrm>
+      </p:grpSpPr>
+      <p:sp>
+        <p:nvSpPr>
+          <p:cNvPr id="2" name="Τίτλος 1">
+            <a:extLst>
+              <a:ext uri="{FF2B5EF4-FFF2-40B4-BE49-F238E27FC236}">
                 <a16:creationId xmlns:a16="http://schemas.microsoft.com/office/drawing/2014/main" id="{9F2CFEB8-EC9E-D18B-6ED6-160CC9253B97}"/>
               </a:ext>
             </a:extLst>
@@ -10012,10 +10693,36 @@
             <p:ph idx="1"/>
           </p:nvPr>
         </p:nvSpPr>
-        <p:spPr/>
+        <p:spPr>
+          <a:xfrm>
+            <a:off x="2589212" y="1739629"/>
+            <a:ext cx="8915400" cy="3777622"/>
+          </a:xfrm>
+        </p:spPr>
         <p:txBody>
           <a:bodyPr/>
           <a:lstStyle/>
+          <a:p>
+            <a:r>
+              <a:rPr lang="en-US" dirty="0">
+                <a:latin typeface="Arial" panose="020B0604020202020204" pitchFamily="34" charset="0"/>
+                <a:cs typeface="Arial" panose="020B0604020202020204" pitchFamily="34" charset="0"/>
+              </a:rPr>
+              <a:t>Access GEMINI through </a:t>
+            </a:r>
+            <a:r>
+              <a:rPr lang="en-US" dirty="0">
+                <a:latin typeface="Arial" panose="020B0604020202020204" pitchFamily="34" charset="0"/>
+                <a:cs typeface="Arial" panose="020B0604020202020204" pitchFamily="34" charset="0"/>
+                <a:hlinkClick r:id="rId2"/>
+              </a:rPr>
+              <a:t>Galaxy Europe</a:t>
+            </a:r>
+            <a:endParaRPr lang="en-US" dirty="0">
+              <a:latin typeface="Arial" panose="020B0604020202020204" pitchFamily="34" charset="0"/>
+              <a:cs typeface="Arial" panose="020B0604020202020204" pitchFamily="34" charset="0"/>
+            </a:endParaRPr>
+          </a:p>
           <a:p>
             <a:r>
               <a:rPr lang="en-US" dirty="0">
@@ -12526,6 +13233,255 @@
 </p:sld>
 </file>
 
+<file path=ppt/slides/slide26.xml><?xml version="1.0" encoding="utf-8"?>
+<p:sld xmlns:a="http://schemas.openxmlformats.org/drawingml/2006/main" xmlns:r="http://schemas.openxmlformats.org/officeDocument/2006/relationships" xmlns:p="http://schemas.openxmlformats.org/presentationml/2006/main">
+  <p:cSld>
+    <p:spTree>
+      <p:nvGrpSpPr>
+        <p:cNvPr id="1" name=""/>
+        <p:cNvGrpSpPr/>
+        <p:nvPr/>
+      </p:nvGrpSpPr>
+      <p:grpSpPr>
+        <a:xfrm>
+          <a:off x="0" y="0"/>
+          <a:ext cx="0" cy="0"/>
+          <a:chOff x="0" y="0"/>
+          <a:chExt cx="0" cy="0"/>
+        </a:xfrm>
+      </p:grpSpPr>
+      <p:sp>
+        <p:nvSpPr>
+          <p:cNvPr id="2" name="Τίτλος 1">
+            <a:extLst>
+              <a:ext uri="{FF2B5EF4-FFF2-40B4-BE49-F238E27FC236}">
+                <a16:creationId xmlns:a16="http://schemas.microsoft.com/office/drawing/2014/main" id="{9F2CFEB8-EC9E-D18B-6ED6-160CC9253B97}"/>
+              </a:ext>
+            </a:extLst>
+          </p:cNvPr>
+          <p:cNvSpPr>
+            <a:spLocks noGrp="1"/>
+          </p:cNvSpPr>
+          <p:nvPr>
+            <p:ph type="title"/>
+          </p:nvPr>
+        </p:nvSpPr>
+        <p:spPr/>
+        <p:txBody>
+          <a:bodyPr/>
+          <a:lstStyle/>
+          <a:p>
+            <a:r>
+              <a:rPr lang="en-US" dirty="0"/>
+              <a:t>Validate results - GEMINI load</a:t>
+            </a:r>
+          </a:p>
+        </p:txBody>
+      </p:sp>
+      <p:sp>
+        <p:nvSpPr>
+          <p:cNvPr id="3" name="Θέση περιεχομένου 2">
+            <a:extLst>
+              <a:ext uri="{FF2B5EF4-FFF2-40B4-BE49-F238E27FC236}">
+                <a16:creationId xmlns:a16="http://schemas.microsoft.com/office/drawing/2014/main" id="{677561BB-04A7-50F0-7572-21F317BD3F79}"/>
+              </a:ext>
+            </a:extLst>
+          </p:cNvPr>
+          <p:cNvSpPr>
+            <a:spLocks noGrp="1"/>
+          </p:cNvSpPr>
+          <p:nvPr>
+            <p:ph idx="1"/>
+          </p:nvPr>
+        </p:nvSpPr>
+        <p:spPr/>
+        <p:txBody>
+          <a:bodyPr/>
+          <a:lstStyle/>
+          <a:p>
+            <a:endParaRPr lang="en-US" dirty="0">
+              <a:latin typeface="Arial" panose="020B0604020202020204" pitchFamily="34" charset="0"/>
+              <a:cs typeface="Arial" panose="020B0604020202020204" pitchFamily="34" charset="0"/>
+            </a:endParaRPr>
+          </a:p>
+        </p:txBody>
+      </p:sp>
+      <p:pic>
+        <p:nvPicPr>
+          <p:cNvPr id="8" name="Εικόνα 7">
+            <a:extLst>
+              <a:ext uri="{FF2B5EF4-FFF2-40B4-BE49-F238E27FC236}">
+                <a16:creationId xmlns:a16="http://schemas.microsoft.com/office/drawing/2014/main" id="{2D0D964F-0FB7-5BB2-D36D-358182B4C07A}"/>
+              </a:ext>
+            </a:extLst>
+          </p:cNvPr>
+          <p:cNvPicPr>
+            <a:picLocks noChangeAspect="1"/>
+          </p:cNvPicPr>
+          <p:nvPr/>
+        </p:nvPicPr>
+        <p:blipFill>
+          <a:blip r:embed="rId2"/>
+          <a:stretch>
+            <a:fillRect/>
+          </a:stretch>
+        </p:blipFill>
+        <p:spPr>
+          <a:xfrm>
+            <a:off x="2589212" y="1488085"/>
+            <a:ext cx="8911687" cy="5068652"/>
+          </a:xfrm>
+          <a:prstGeom prst="rect">
+            <a:avLst/>
+          </a:prstGeom>
+          <a:ln>
+            <a:solidFill>
+              <a:schemeClr val="accent1"/>
+            </a:solidFill>
+          </a:ln>
+        </p:spPr>
+      </p:pic>
+    </p:spTree>
+    <p:extLst>
+      <p:ext uri="{BB962C8B-B14F-4D97-AF65-F5344CB8AC3E}">
+        <p14:creationId xmlns:p14="http://schemas.microsoft.com/office/powerpoint/2010/main" val="1185358738"/>
+      </p:ext>
+    </p:extLst>
+  </p:cSld>
+  <p:clrMapOvr>
+    <a:masterClrMapping/>
+  </p:clrMapOvr>
+</p:sld>
+</file>
+
+<file path=ppt/slides/slide27.xml><?xml version="1.0" encoding="utf-8"?>
+<p:sld xmlns:a="http://schemas.openxmlformats.org/drawingml/2006/main" xmlns:r="http://schemas.openxmlformats.org/officeDocument/2006/relationships" xmlns:p="http://schemas.openxmlformats.org/presentationml/2006/main">
+  <p:cSld>
+    <p:spTree>
+      <p:nvGrpSpPr>
+        <p:cNvPr id="1" name=""/>
+        <p:cNvGrpSpPr/>
+        <p:nvPr/>
+      </p:nvGrpSpPr>
+      <p:grpSpPr>
+        <a:xfrm>
+          <a:off x="0" y="0"/>
+          <a:ext cx="0" cy="0"/>
+          <a:chOff x="0" y="0"/>
+          <a:chExt cx="0" cy="0"/>
+        </a:xfrm>
+      </p:grpSpPr>
+      <p:sp>
+        <p:nvSpPr>
+          <p:cNvPr id="2" name="Τίτλος 1">
+            <a:extLst>
+              <a:ext uri="{FF2B5EF4-FFF2-40B4-BE49-F238E27FC236}">
+                <a16:creationId xmlns:a16="http://schemas.microsoft.com/office/drawing/2014/main" id="{9F2CFEB8-EC9E-D18B-6ED6-160CC9253B97}"/>
+              </a:ext>
+            </a:extLst>
+          </p:cNvPr>
+          <p:cNvSpPr>
+            <a:spLocks noGrp="1"/>
+          </p:cNvSpPr>
+          <p:nvPr>
+            <p:ph type="title"/>
+          </p:nvPr>
+        </p:nvSpPr>
+        <p:spPr>
+          <a:xfrm>
+            <a:off x="2592925" y="117121"/>
+            <a:ext cx="8911687" cy="1280890"/>
+          </a:xfrm>
+        </p:spPr>
+        <p:txBody>
+          <a:bodyPr>
+            <a:normAutofit/>
+          </a:bodyPr>
+          <a:lstStyle/>
+          <a:p>
+            <a:r>
+              <a:rPr lang="en-US" dirty="0"/>
+              <a:t>Validate results - GEMINI inheritance pattern</a:t>
+            </a:r>
+          </a:p>
+        </p:txBody>
+      </p:sp>
+      <p:sp>
+        <p:nvSpPr>
+          <p:cNvPr id="3" name="Θέση περιεχομένου 2">
+            <a:extLst>
+              <a:ext uri="{FF2B5EF4-FFF2-40B4-BE49-F238E27FC236}">
+                <a16:creationId xmlns:a16="http://schemas.microsoft.com/office/drawing/2014/main" id="{677561BB-04A7-50F0-7572-21F317BD3F79}"/>
+              </a:ext>
+            </a:extLst>
+          </p:cNvPr>
+          <p:cNvSpPr>
+            <a:spLocks noGrp="1"/>
+          </p:cNvSpPr>
+          <p:nvPr>
+            <p:ph idx="1"/>
+          </p:nvPr>
+        </p:nvSpPr>
+        <p:spPr/>
+        <p:txBody>
+          <a:bodyPr/>
+          <a:lstStyle/>
+          <a:p>
+            <a:endParaRPr lang="en-US" dirty="0">
+              <a:latin typeface="Arial" panose="020B0604020202020204" pitchFamily="34" charset="0"/>
+              <a:cs typeface="Arial" panose="020B0604020202020204" pitchFamily="34" charset="0"/>
+            </a:endParaRPr>
+          </a:p>
+        </p:txBody>
+      </p:sp>
+      <p:pic>
+        <p:nvPicPr>
+          <p:cNvPr id="5" name="Εικόνα 4">
+            <a:extLst>
+              <a:ext uri="{FF2B5EF4-FFF2-40B4-BE49-F238E27FC236}">
+                <a16:creationId xmlns:a16="http://schemas.microsoft.com/office/drawing/2014/main" id="{FF78F702-0A6D-51E3-1AF0-AD96108BC044}"/>
+              </a:ext>
+            </a:extLst>
+          </p:cNvPr>
+          <p:cNvPicPr>
+            <a:picLocks noChangeAspect="1"/>
+          </p:cNvPicPr>
+          <p:nvPr/>
+        </p:nvPicPr>
+        <p:blipFill>
+          <a:blip r:embed="rId2"/>
+          <a:stretch>
+            <a:fillRect/>
+          </a:stretch>
+        </p:blipFill>
+        <p:spPr>
+          <a:xfrm>
+            <a:off x="2589212" y="1398011"/>
+            <a:ext cx="8421581" cy="5248800"/>
+          </a:xfrm>
+          <a:prstGeom prst="rect">
+            <a:avLst/>
+          </a:prstGeom>
+          <a:ln>
+            <a:solidFill>
+              <a:schemeClr val="accent1"/>
+            </a:solidFill>
+          </a:ln>
+        </p:spPr>
+      </p:pic>
+    </p:spTree>
+    <p:extLst>
+      <p:ext uri="{BB962C8B-B14F-4D97-AF65-F5344CB8AC3E}">
+        <p14:creationId xmlns:p14="http://schemas.microsoft.com/office/powerpoint/2010/main" val="1872166162"/>
+      </p:ext>
+    </p:extLst>
+  </p:cSld>
+  <p:clrMapOvr>
+    <a:masterClrMapping/>
+  </p:clrMapOvr>
+</p:sld>
+</file>
+
 <file path=ppt/slides/slide3.xml><?xml version="1.0" encoding="utf-8"?>
 <p:sld xmlns:a="http://schemas.openxmlformats.org/drawingml/2006/main" xmlns:r="http://schemas.openxmlformats.org/officeDocument/2006/relationships" xmlns:p="http://schemas.openxmlformats.org/presentationml/2006/main">
   <p:cSld>
@@ -12698,7 +13654,7 @@
                 <a:latin typeface="Arial" panose="020B0604020202020204" pitchFamily="34" charset="0"/>
                 <a:cs typeface="Arial" panose="020B0604020202020204" pitchFamily="34" charset="0"/>
               </a:rPr>
-              <a:t>(Optional) Explore a similar workflow in the original Galaxy </a:t>
+              <a:t>(Optional) Explore the original workflow using Galaxy </a:t>
             </a:r>
             <a:r>
               <a:rPr lang="en-US" sz="2000" dirty="0">
@@ -12710,6 +13666,16 @@
                 <a:hlinkClick r:id="rId3"/>
               </a:rPr>
               <a:t>tutorial</a:t>
+            </a:r>
+            <a:r>
+              <a:rPr lang="en-US" sz="2000" dirty="0">
+                <a:solidFill>
+                  <a:srgbClr val="212529"/>
+                </a:solidFill>
+                <a:latin typeface="Arial" panose="020B0604020202020204" pitchFamily="34" charset="0"/>
+                <a:cs typeface="Arial" panose="020B0604020202020204" pitchFamily="34" charset="0"/>
+              </a:rPr>
+              <a:t> (Galaxy Europe tools only)</a:t>
             </a:r>
             <a:endParaRPr lang="en-US" sz="2000" dirty="0">
               <a:latin typeface="Arial" panose="020B0604020202020204" pitchFamily="34" charset="0"/>
@@ -14078,7 +15044,7 @@
           <p:cNvPr id="2" name="Τίτλος 1">
             <a:extLst>
               <a:ext uri="{FF2B5EF4-FFF2-40B4-BE49-F238E27FC236}">
-                <a16:creationId xmlns:a16="http://schemas.microsoft.com/office/drawing/2014/main" id="{F0300657-4206-75AF-86C8-E86F6EBE0B5C}"/>
+                <a16:creationId xmlns:a16="http://schemas.microsoft.com/office/drawing/2014/main" id="{B3FE32A4-470D-99A8-620F-E726A9D407AF}"/>
               </a:ext>
             </a:extLst>
           </p:cNvPr>
@@ -14096,7 +15062,7 @@
           <a:p>
             <a:r>
               <a:rPr lang="en-US" dirty="0"/>
-              <a:t>Steps prior to Variant detection</a:t>
+              <a:t>SAM &amp; BAM format</a:t>
             </a:r>
           </a:p>
         </p:txBody>
@@ -14106,7 +15072,7 @@
           <p:cNvPr id="3" name="Θέση περιεχομένου 2">
             <a:extLst>
               <a:ext uri="{FF2B5EF4-FFF2-40B4-BE49-F238E27FC236}">
-                <a16:creationId xmlns:a16="http://schemas.microsoft.com/office/drawing/2014/main" id="{F89B6D53-6D09-A4F9-982C-F01BF9C25915}"/>
+                <a16:creationId xmlns:a16="http://schemas.microsoft.com/office/drawing/2014/main" id="{2AECB12B-0203-ACBA-61A2-0A01EBD780DF}"/>
               </a:ext>
             </a:extLst>
           </p:cNvPr>
@@ -14119,135 +15085,179 @@
         </p:nvSpPr>
         <p:spPr>
           <a:xfrm>
-            <a:off x="2589212" y="2133600"/>
-            <a:ext cx="9307716" cy="4539574"/>
+            <a:off x="2592925" y="4216107"/>
+            <a:ext cx="9128912" cy="2418157"/>
           </a:xfrm>
         </p:spPr>
         <p:txBody>
           <a:bodyPr>
-            <a:normAutofit lnSpcReduction="10000"/>
+            <a:normAutofit fontScale="85000" lnSpcReduction="10000"/>
           </a:bodyPr>
           <a:lstStyle/>
           <a:p>
-            <a:r>
-              <a:rPr lang="en-US" sz="2400" dirty="0">
-                <a:latin typeface="Arial" panose="020B0604020202020204" pitchFamily="34" charset="0"/>
-                <a:cs typeface="Arial" panose="020B0604020202020204" pitchFamily="34" charset="0"/>
-              </a:rPr>
-              <a:t>Quality control</a:t>
-            </a:r>
-          </a:p>
-          <a:p>
-            <a:r>
-              <a:rPr lang="en-US" sz="2400" dirty="0">
-                <a:latin typeface="Arial" panose="020B0604020202020204" pitchFamily="34" charset="0"/>
-                <a:cs typeface="Arial" panose="020B0604020202020204" pitchFamily="34" charset="0"/>
-              </a:rPr>
-              <a:t>Trimming of low-quality and/or adapter sequences</a:t>
-            </a:r>
-          </a:p>
-          <a:p>
-            <a:r>
-              <a:rPr lang="en-US" sz="2400" dirty="0">
-                <a:latin typeface="Arial" panose="020B0604020202020204" pitchFamily="34" charset="0"/>
-                <a:cs typeface="Arial" panose="020B0604020202020204" pitchFamily="34" charset="0"/>
-              </a:rPr>
-              <a:t>Mapping reads to reference genome</a:t>
-            </a:r>
-          </a:p>
-          <a:p>
-            <a:r>
-              <a:rPr lang="en-US" sz="2400" dirty="0">
-                <a:latin typeface="Arial" panose="020B0604020202020204" pitchFamily="34" charset="0"/>
-                <a:cs typeface="Arial" panose="020B0604020202020204" pitchFamily="34" charset="0"/>
-              </a:rPr>
-              <a:t>Post-processing of mapped reads</a:t>
-            </a:r>
-          </a:p>
-          <a:p>
-            <a:pPr lvl="1">
-              <a:buFont typeface="Courier New" panose="02070309020205020404" pitchFamily="49" charset="0"/>
-              <a:buChar char="o"/>
-            </a:pPr>
-            <a:r>
-              <a:rPr lang="en-US" sz="2800" dirty="0">
-                <a:latin typeface="Arial" panose="020B0604020202020204" pitchFamily="34" charset="0"/>
-                <a:cs typeface="Arial" panose="020B0604020202020204" pitchFamily="34" charset="0"/>
-              </a:rPr>
-              <a:t>SAM-to-BAM format conversion</a:t>
-            </a:r>
-          </a:p>
-          <a:p>
-            <a:pPr lvl="1">
-              <a:buFont typeface="Courier New" panose="02070309020205020404" pitchFamily="49" charset="0"/>
-              <a:buChar char="o"/>
-            </a:pPr>
-            <a:r>
-              <a:rPr lang="en-US" sz="2000" dirty="0">
-                <a:latin typeface="Arial" panose="020B0604020202020204" pitchFamily="34" charset="0"/>
-                <a:cs typeface="Arial" panose="020B0604020202020204" pitchFamily="34" charset="0"/>
-              </a:rPr>
-              <a:t>Generating mapping summary statistics</a:t>
-            </a:r>
-          </a:p>
-          <a:p>
-            <a:pPr lvl="1">
-              <a:buFont typeface="Courier New" panose="02070309020205020404" pitchFamily="49" charset="0"/>
-              <a:buChar char="o"/>
-            </a:pPr>
-            <a:r>
-              <a:rPr lang="en-US" sz="2000" dirty="0">
-                <a:latin typeface="Arial" panose="020B0604020202020204" pitchFamily="34" charset="0"/>
-                <a:cs typeface="Arial" panose="020B0604020202020204" pitchFamily="34" charset="0"/>
-              </a:rPr>
-              <a:t>Filtering reads based on SAM/BAM flags</a:t>
-            </a:r>
-          </a:p>
-          <a:p>
-            <a:pPr lvl="1">
-              <a:buFont typeface="Courier New" panose="02070309020205020404" pitchFamily="49" charset="0"/>
-              <a:buChar char="o"/>
-            </a:pPr>
-            <a:r>
-              <a:rPr lang="en-US" sz="2000" dirty="0">
-                <a:latin typeface="Arial" panose="020B0604020202020204" pitchFamily="34" charset="0"/>
-                <a:cs typeface="Arial" panose="020B0604020202020204" pitchFamily="34" charset="0"/>
-              </a:rPr>
-              <a:t>Add information in BAM files</a:t>
-            </a:r>
-          </a:p>
-          <a:p>
-            <a:pPr lvl="1">
-              <a:buFont typeface="Courier New" panose="02070309020205020404" pitchFamily="49" charset="0"/>
-              <a:buChar char="o"/>
-            </a:pPr>
-            <a:r>
-              <a:rPr lang="en-US" sz="2000" dirty="0">
-                <a:latin typeface="Arial" panose="020B0604020202020204" pitchFamily="34" charset="0"/>
-                <a:cs typeface="Arial" panose="020B0604020202020204" pitchFamily="34" charset="0"/>
-              </a:rPr>
-              <a:t>Mark duplicated reads</a:t>
-            </a:r>
-          </a:p>
-          <a:p>
-            <a:pPr lvl="1">
-              <a:buFont typeface="Courier New" panose="02070309020205020404" pitchFamily="49" charset="0"/>
-              <a:buChar char="o"/>
-            </a:pPr>
-            <a:r>
-              <a:rPr lang="en-US" sz="2000" dirty="0">
-                <a:latin typeface="Arial" panose="020B0604020202020204" pitchFamily="34" charset="0"/>
-                <a:cs typeface="Arial" panose="020B0604020202020204" pitchFamily="34" charset="0"/>
-              </a:rPr>
-              <a:t>Generate reference indexes</a:t>
-            </a:r>
+            <a:pPr algn="just"/>
+            <a:r>
+              <a:rPr lang="en-US" sz="1600" dirty="0">
+                <a:latin typeface="Arial" panose="020B0604020202020204" pitchFamily="34" charset="0"/>
+                <a:cs typeface="Arial" panose="020B0604020202020204" pitchFamily="34" charset="0"/>
+              </a:rPr>
+              <a:t>SAM stands for </a:t>
+            </a:r>
+            <a:r>
+              <a:rPr lang="en-US" sz="1600" u="sng" dirty="0">
+                <a:latin typeface="Arial" panose="020B0604020202020204" pitchFamily="34" charset="0"/>
+                <a:cs typeface="Arial" panose="020B0604020202020204" pitchFamily="34" charset="0"/>
+              </a:rPr>
+              <a:t>S</a:t>
+            </a:r>
+            <a:r>
+              <a:rPr lang="en-US" sz="1600" dirty="0">
+                <a:latin typeface="Arial" panose="020B0604020202020204" pitchFamily="34" charset="0"/>
+                <a:cs typeface="Arial" panose="020B0604020202020204" pitchFamily="34" charset="0"/>
+              </a:rPr>
+              <a:t>equence </a:t>
+            </a:r>
+            <a:r>
+              <a:rPr lang="en-US" sz="1600" u="sng" dirty="0">
+                <a:latin typeface="Arial" panose="020B0604020202020204" pitchFamily="34" charset="0"/>
+                <a:cs typeface="Arial" panose="020B0604020202020204" pitchFamily="34" charset="0"/>
+              </a:rPr>
+              <a:t>A</a:t>
+            </a:r>
+            <a:r>
+              <a:rPr lang="en-US" sz="1600" dirty="0">
+                <a:latin typeface="Arial" panose="020B0604020202020204" pitchFamily="34" charset="0"/>
+                <a:cs typeface="Arial" panose="020B0604020202020204" pitchFamily="34" charset="0"/>
+              </a:rPr>
+              <a:t>lignment/</a:t>
+            </a:r>
+            <a:r>
+              <a:rPr lang="en-US" sz="1600" u="sng" dirty="0">
+                <a:latin typeface="Arial" panose="020B0604020202020204" pitchFamily="34" charset="0"/>
+                <a:cs typeface="Arial" panose="020B0604020202020204" pitchFamily="34" charset="0"/>
+              </a:rPr>
+              <a:t>M</a:t>
+            </a:r>
+            <a:r>
+              <a:rPr lang="en-US" sz="1600" dirty="0">
+                <a:latin typeface="Arial" panose="020B0604020202020204" pitchFamily="34" charset="0"/>
+                <a:cs typeface="Arial" panose="020B0604020202020204" pitchFamily="34" charset="0"/>
+              </a:rPr>
+              <a:t>ap format.</a:t>
+            </a:r>
+          </a:p>
+          <a:p>
+            <a:pPr algn="just"/>
+            <a:r>
+              <a:rPr lang="en-US" sz="1600" dirty="0">
+                <a:latin typeface="Arial" panose="020B0604020202020204" pitchFamily="34" charset="0"/>
+                <a:cs typeface="Arial" panose="020B0604020202020204" pitchFamily="34" charset="0"/>
+              </a:rPr>
+              <a:t>It is a TAB-delimited text format consisting of a header section, which is optional, and an alignment section. If present, the header must be prior to the alignments.</a:t>
+            </a:r>
+          </a:p>
+          <a:p>
+            <a:pPr algn="just"/>
+            <a:r>
+              <a:rPr lang="en-US" sz="1600" dirty="0">
+                <a:latin typeface="Arial" panose="020B0604020202020204" pitchFamily="34" charset="0"/>
+                <a:cs typeface="Arial" panose="020B0604020202020204" pitchFamily="34" charset="0"/>
+              </a:rPr>
+              <a:t>Header lines start with ‘@’, while alignment lines do not. Each alignment line has 11 mandatory fields for essential alignment information such as mapping position, and variable number of optional fields for flexible or aligner specific information.</a:t>
+            </a:r>
+          </a:p>
+          <a:p>
+            <a:pPr algn="just"/>
+            <a:r>
+              <a:rPr lang="en-US" sz="1600" b="0" i="0" dirty="0">
+                <a:solidFill>
+                  <a:srgbClr val="333333"/>
+                </a:solidFill>
+                <a:effectLst/>
+                <a:latin typeface="Arial" panose="020B0604020202020204" pitchFamily="34" charset="0"/>
+              </a:rPr>
+              <a:t>A BAM file (*.bam) is the compressed binary version of a SAM file that is used to represent aligned sequences up to 128 Mb. </a:t>
+            </a:r>
+          </a:p>
+          <a:p>
+            <a:pPr algn="just"/>
+            <a:r>
+              <a:rPr lang="en-US" sz="1600" b="0" i="0" dirty="0">
+                <a:solidFill>
+                  <a:srgbClr val="333333"/>
+                </a:solidFill>
+                <a:effectLst/>
+                <a:latin typeface="Arial" panose="020B0604020202020204" pitchFamily="34" charset="0"/>
+              </a:rPr>
+              <a:t>SAM and BAM formats are described in detail at </a:t>
+            </a:r>
+            <a:r>
+              <a:rPr lang="en-US" sz="1800" b="0" i="0" u="none" strike="noStrike" dirty="0">
+                <a:solidFill>
+                  <a:srgbClr val="3D84CC"/>
+                </a:solidFill>
+                <a:effectLst/>
+                <a:latin typeface="Arial" panose="020B0604020202020204" pitchFamily="34" charset="0"/>
+                <a:hlinkClick r:id="rId2"/>
+              </a:rPr>
+              <a:t>https://samtools.github.io/hts-specs/SAMv1.pdf</a:t>
+            </a:r>
+            <a:r>
+              <a:rPr lang="en-US" sz="1600" b="0" i="0" dirty="0">
+                <a:solidFill>
+                  <a:srgbClr val="333333"/>
+                </a:solidFill>
+                <a:effectLst/>
+                <a:latin typeface="Arial" panose="020B0604020202020204" pitchFamily="34" charset="0"/>
+              </a:rPr>
+              <a:t>.</a:t>
+            </a:r>
+            <a:endParaRPr lang="en-US" sz="1600" dirty="0">
+              <a:latin typeface="Arial" panose="020B0604020202020204" pitchFamily="34" charset="0"/>
+              <a:cs typeface="Arial" panose="020B0604020202020204" pitchFamily="34" charset="0"/>
+            </a:endParaRPr>
           </a:p>
         </p:txBody>
       </p:sp>
+      <p:pic>
+        <p:nvPicPr>
+          <p:cNvPr id="5" name="Εικόνα 4">
+            <a:extLst>
+              <a:ext uri="{FF2B5EF4-FFF2-40B4-BE49-F238E27FC236}">
+                <a16:creationId xmlns:a16="http://schemas.microsoft.com/office/drawing/2014/main" id="{D683F6F8-7211-582A-FF60-642827E96E5A}"/>
+              </a:ext>
+            </a:extLst>
+          </p:cNvPr>
+          <p:cNvPicPr>
+            <a:picLocks noChangeAspect="1"/>
+          </p:cNvPicPr>
+          <p:nvPr/>
+        </p:nvPicPr>
+        <p:blipFill>
+          <a:blip r:embed="rId3"/>
+          <a:stretch>
+            <a:fillRect/>
+          </a:stretch>
+        </p:blipFill>
+        <p:spPr>
+          <a:xfrm>
+            <a:off x="2592925" y="1905000"/>
+            <a:ext cx="9128912" cy="2127125"/>
+          </a:xfrm>
+          <a:prstGeom prst="rect">
+            <a:avLst/>
+          </a:prstGeom>
+          <a:ln>
+            <a:solidFill>
+              <a:schemeClr val="accent1"/>
+            </a:solidFill>
+          </a:ln>
+        </p:spPr>
+      </p:pic>
     </p:spTree>
     <p:extLst>
       <p:ext uri="{BB962C8B-B14F-4D97-AF65-F5344CB8AC3E}">
-        <p14:creationId xmlns:p14="http://schemas.microsoft.com/office/powerpoint/2010/main" val="2817376352"/>
+        <p14:creationId xmlns:p14="http://schemas.microsoft.com/office/powerpoint/2010/main" val="1681058650"/>
       </p:ext>
     </p:extLst>
   </p:cSld>

</xml_diff>

<commit_message>
Update day 1 and day 2 (PLINK) scripts and README
</commit_message>
<xml_diff>
--- a/day 1/germline_variant_calling_slides.pptx
+++ b/day 1/germline_variant_calling_slides.pptx
@@ -7719,7 +7719,7 @@
         </p:nvSpPr>
         <p:spPr>
           <a:xfrm>
-            <a:off x="2395453" y="3190670"/>
+            <a:off x="2395453" y="2568101"/>
             <a:ext cx="7594853" cy="2262781"/>
           </a:xfrm>
           <a:ln>
@@ -7759,7 +7759,7 @@
         </p:nvSpPr>
         <p:spPr>
           <a:xfrm>
-            <a:off x="2395453" y="5665330"/>
+            <a:off x="2395453" y="5042761"/>
             <a:ext cx="9144000" cy="1655762"/>
           </a:xfrm>
           <a:ln>

</xml_diff>